<commit_message>
Final commit for deadline first version
</commit_message>
<xml_diff>
--- a/Figures/Figures_new.pptx
+++ b/Figures/Figures_new.pptx
@@ -7,7 +7,11 @@
   <p:sldIdLst>
     <p:sldId id="257" r:id="rId2"/>
     <p:sldId id="256" r:id="rId3"/>
-    <p:sldId id="258" r:id="rId4"/>
+    <p:sldId id="262" r:id="rId4"/>
+    <p:sldId id="259" r:id="rId5"/>
+    <p:sldId id="260" r:id="rId6"/>
+    <p:sldId id="261" r:id="rId7"/>
+    <p:sldId id="258" r:id="rId8"/>
   </p:sldIdLst>
   <p:sldSz cx="12192000" cy="6858000"/>
   <p:notesSz cx="6858000" cy="9144000"/>
@@ -3039,8 +3043,8 @@
           </a:prstGeom>
           <a:solidFill>
             <a:schemeClr val="accent1">
-              <a:lumMod val="40000"/>
-              <a:lumOff val="60000"/>
+              <a:lumMod val="60000"/>
+              <a:lumOff val="40000"/>
             </a:schemeClr>
           </a:solidFill>
         </p:spPr>
@@ -4704,23 +4708,3589 @@
           <a:chExt cx="0" cy="0"/>
         </a:xfrm>
       </p:grpSpPr>
-      <p:sp>
-        <p:nvSpPr>
-          <p:cNvPr id="13" name="Nach unten gekrümmter Pfeil 12"/>
+      <p:cxnSp>
+        <p:nvCxnSpPr>
+          <p:cNvPr id="5" name="Gerader Verbinder 4"/>
+          <p:cNvCxnSpPr/>
+          <p:nvPr/>
+        </p:nvCxnSpPr>
+        <p:spPr>
+          <a:xfrm flipH="1">
+            <a:off x="2567128" y="1247144"/>
+            <a:ext cx="0" cy="5519956"/>
+          </a:xfrm>
+          <a:prstGeom prst="line">
+            <a:avLst/>
+          </a:prstGeom>
+          <a:ln w="19050">
+            <a:solidFill>
+              <a:schemeClr val="bg1">
+                <a:lumMod val="65000"/>
+              </a:schemeClr>
+            </a:solidFill>
+            <a:prstDash val="lgDash"/>
+          </a:ln>
+        </p:spPr>
+        <p:style>
+          <a:lnRef idx="1">
+            <a:schemeClr val="accent1"/>
+          </a:lnRef>
+          <a:fillRef idx="0">
+            <a:schemeClr val="accent1"/>
+          </a:fillRef>
+          <a:effectRef idx="0">
+            <a:schemeClr val="accent1"/>
+          </a:effectRef>
+          <a:fontRef idx="minor">
+            <a:schemeClr val="tx1"/>
+          </a:fontRef>
+        </p:style>
+      </p:cxnSp>
+      <p:cxnSp>
+        <p:nvCxnSpPr>
+          <p:cNvPr id="6" name="Gerader Verbinder 5"/>
+          <p:cNvCxnSpPr/>
+          <p:nvPr/>
+        </p:nvCxnSpPr>
+        <p:spPr>
+          <a:xfrm flipH="1">
+            <a:off x="6154088" y="1247144"/>
+            <a:ext cx="0" cy="5519956"/>
+          </a:xfrm>
+          <a:prstGeom prst="line">
+            <a:avLst/>
+          </a:prstGeom>
+          <a:ln w="19050">
+            <a:solidFill>
+              <a:schemeClr val="bg1">
+                <a:lumMod val="75000"/>
+              </a:schemeClr>
+            </a:solidFill>
+            <a:prstDash val="lgDash"/>
+          </a:ln>
+        </p:spPr>
+        <p:style>
+          <a:lnRef idx="1">
+            <a:schemeClr val="accent1"/>
+          </a:lnRef>
+          <a:fillRef idx="0">
+            <a:schemeClr val="accent1"/>
+          </a:fillRef>
+          <a:effectRef idx="0">
+            <a:schemeClr val="accent1"/>
+          </a:effectRef>
+          <a:fontRef idx="minor">
+            <a:schemeClr val="tx1"/>
+          </a:fontRef>
+        </p:style>
+      </p:cxnSp>
+      <p:cxnSp>
+        <p:nvCxnSpPr>
+          <p:cNvPr id="8" name="Gerade Verbindung mit Pfeil 7"/>
+          <p:cNvCxnSpPr/>
+          <p:nvPr/>
+        </p:nvCxnSpPr>
+        <p:spPr>
+          <a:xfrm flipH="1">
+            <a:off x="2567129" y="1661814"/>
+            <a:ext cx="3586959" cy="0"/>
+          </a:xfrm>
+          <a:prstGeom prst="straightConnector1">
+            <a:avLst/>
+          </a:prstGeom>
+          <a:ln w="19050">
+            <a:solidFill>
+              <a:schemeClr val="tx1"/>
+            </a:solidFill>
+            <a:tailEnd type="triangle" w="lg" len="lg"/>
+          </a:ln>
+        </p:spPr>
+        <p:style>
+          <a:lnRef idx="1">
+            <a:schemeClr val="accent1"/>
+          </a:lnRef>
+          <a:fillRef idx="0">
+            <a:schemeClr val="accent1"/>
+          </a:fillRef>
+          <a:effectRef idx="0">
+            <a:schemeClr val="accent1"/>
+          </a:effectRef>
+          <a:fontRef idx="minor">
+            <a:schemeClr val="tx1"/>
+          </a:fontRef>
+        </p:style>
+      </p:cxnSp>
+      <p:sp>
+        <p:nvSpPr>
+          <p:cNvPr id="9" name="Textfeld 8"/>
+          <p:cNvSpPr txBox="1"/>
+          <p:nvPr/>
+        </p:nvSpPr>
+        <p:spPr>
+          <a:xfrm>
+            <a:off x="2971571" y="1292482"/>
+            <a:ext cx="3195560" cy="369332"/>
+          </a:xfrm>
+          <a:prstGeom prst="rect">
+            <a:avLst/>
+          </a:prstGeom>
+          <a:noFill/>
+        </p:spPr>
+        <p:txBody>
+          <a:bodyPr wrap="square" rtlCol="0">
+            <a:spAutoFit/>
+          </a:bodyPr>
+          <a:lstStyle/>
+          <a:p>
+            <a:r>
+              <a:rPr lang="de-DE" noProof="1" smtClean="0"/>
+              <a:t>Reference Signal, PSS, SSS</a:t>
+            </a:r>
+            <a:endParaRPr lang="de-DE" noProof="1"/>
+          </a:p>
+        </p:txBody>
+      </p:sp>
+      <p:cxnSp>
+        <p:nvCxnSpPr>
+          <p:cNvPr id="11" name="Gerade Verbindung mit Pfeil 10"/>
+          <p:cNvCxnSpPr/>
+          <p:nvPr/>
+        </p:nvCxnSpPr>
+        <p:spPr>
+          <a:xfrm flipH="1">
+            <a:off x="2582992" y="1988752"/>
+            <a:ext cx="3600000" cy="0"/>
+          </a:xfrm>
+          <a:prstGeom prst="straightConnector1">
+            <a:avLst/>
+          </a:prstGeom>
+          <a:ln w="19050">
+            <a:solidFill>
+              <a:schemeClr val="tx1"/>
+            </a:solidFill>
+            <a:tailEnd type="triangle" w="lg" len="lg"/>
+          </a:ln>
+        </p:spPr>
+        <p:style>
+          <a:lnRef idx="1">
+            <a:schemeClr val="accent1"/>
+          </a:lnRef>
+          <a:fillRef idx="0">
+            <a:schemeClr val="accent1"/>
+          </a:fillRef>
+          <a:effectRef idx="0">
+            <a:schemeClr val="accent1"/>
+          </a:effectRef>
+          <a:fontRef idx="minor">
+            <a:schemeClr val="tx1"/>
+          </a:fontRef>
+        </p:style>
+      </p:cxnSp>
+      <p:cxnSp>
+        <p:nvCxnSpPr>
+          <p:cNvPr id="12" name="Gerade Verbindung mit Pfeil 11"/>
+          <p:cNvCxnSpPr/>
+          <p:nvPr/>
+        </p:nvCxnSpPr>
+        <p:spPr>
+          <a:xfrm>
+            <a:off x="2582992" y="3770808"/>
+            <a:ext cx="3600000" cy="0"/>
+          </a:xfrm>
+          <a:prstGeom prst="straightConnector1">
+            <a:avLst/>
+          </a:prstGeom>
+          <a:ln w="19050">
+            <a:solidFill>
+              <a:schemeClr val="tx1"/>
+            </a:solidFill>
+            <a:tailEnd type="triangle" w="lg" len="lg"/>
+          </a:ln>
+        </p:spPr>
+        <p:style>
+          <a:lnRef idx="1">
+            <a:schemeClr val="accent1"/>
+          </a:lnRef>
+          <a:fillRef idx="0">
+            <a:schemeClr val="accent1"/>
+          </a:fillRef>
+          <a:effectRef idx="0">
+            <a:schemeClr val="accent1"/>
+          </a:effectRef>
+          <a:fontRef idx="minor">
+            <a:schemeClr val="tx1"/>
+          </a:fontRef>
+        </p:style>
+      </p:cxnSp>
+      <p:sp>
+        <p:nvSpPr>
+          <p:cNvPr id="17" name="Textfeld 16"/>
+          <p:cNvSpPr txBox="1"/>
+          <p:nvPr/>
+        </p:nvSpPr>
+        <p:spPr>
+          <a:xfrm>
+            <a:off x="2971570" y="1639894"/>
+            <a:ext cx="3182517" cy="369332"/>
+          </a:xfrm>
+          <a:prstGeom prst="rect">
+            <a:avLst/>
+          </a:prstGeom>
+          <a:noFill/>
+        </p:spPr>
+        <p:txBody>
+          <a:bodyPr wrap="square" rtlCol="0">
+            <a:spAutoFit/>
+          </a:bodyPr>
+          <a:lstStyle/>
+          <a:p>
+            <a:r>
+              <a:rPr lang="de-DE" noProof="1" smtClean="0"/>
+              <a:t>MIB, SIB 1, SIB2, …</a:t>
+            </a:r>
+            <a:endParaRPr lang="de-DE" noProof="1"/>
+          </a:p>
+        </p:txBody>
+      </p:sp>
+      <p:sp>
+        <p:nvSpPr>
+          <p:cNvPr id="19" name="Textfeld 18"/>
+          <p:cNvSpPr txBox="1"/>
+          <p:nvPr/>
+        </p:nvSpPr>
+        <p:spPr>
+          <a:xfrm>
+            <a:off x="2891468" y="3396784"/>
+            <a:ext cx="3268274" cy="369332"/>
+          </a:xfrm>
+          <a:prstGeom prst="rect">
+            <a:avLst/>
+          </a:prstGeom>
+          <a:noFill/>
+        </p:spPr>
+        <p:txBody>
+          <a:bodyPr wrap="square" rtlCol="0">
+            <a:spAutoFit/>
+          </a:bodyPr>
+          <a:lstStyle/>
+          <a:p>
+            <a:r>
+              <a:rPr lang="de-DE" noProof="1" smtClean="0"/>
+              <a:t>PRACH Preamble</a:t>
+            </a:r>
+            <a:endParaRPr lang="de-DE" noProof="1"/>
+          </a:p>
+        </p:txBody>
+      </p:sp>
+      <p:cxnSp>
+        <p:nvCxnSpPr>
+          <p:cNvPr id="20" name="Gerade Verbindung mit Pfeil 19"/>
+          <p:cNvCxnSpPr/>
+          <p:nvPr/>
+        </p:nvCxnSpPr>
+        <p:spPr>
+          <a:xfrm flipH="1">
+            <a:off x="2567130" y="4144833"/>
+            <a:ext cx="3600000" cy="0"/>
+          </a:xfrm>
+          <a:prstGeom prst="straightConnector1">
+            <a:avLst/>
+          </a:prstGeom>
+          <a:ln w="19050">
+            <a:solidFill>
+              <a:schemeClr val="tx1"/>
+            </a:solidFill>
+            <a:tailEnd type="triangle" w="lg" len="lg"/>
+          </a:ln>
+        </p:spPr>
+        <p:style>
+          <a:lnRef idx="1">
+            <a:schemeClr val="accent1"/>
+          </a:lnRef>
+          <a:fillRef idx="0">
+            <a:schemeClr val="accent1"/>
+          </a:fillRef>
+          <a:effectRef idx="0">
+            <a:schemeClr val="accent1"/>
+          </a:effectRef>
+          <a:fontRef idx="minor">
+            <a:schemeClr val="tx1"/>
+          </a:fontRef>
+        </p:style>
+      </p:cxnSp>
+      <p:sp>
+        <p:nvSpPr>
+          <p:cNvPr id="21" name="Textfeld 20"/>
+          <p:cNvSpPr txBox="1"/>
+          <p:nvPr/>
+        </p:nvSpPr>
+        <p:spPr>
+          <a:xfrm>
+            <a:off x="2885814" y="3770808"/>
+            <a:ext cx="3268274" cy="369332"/>
+          </a:xfrm>
+          <a:prstGeom prst="rect">
+            <a:avLst/>
+          </a:prstGeom>
+          <a:noFill/>
+        </p:spPr>
+        <p:txBody>
+          <a:bodyPr wrap="square" rtlCol="0">
+            <a:spAutoFit/>
+          </a:bodyPr>
+          <a:lstStyle/>
+          <a:p>
+            <a:r>
+              <a:rPr lang="de-DE" noProof="1" smtClean="0"/>
+              <a:t>PRACH Preamble Response</a:t>
+            </a:r>
+            <a:endParaRPr lang="de-DE" noProof="1"/>
+          </a:p>
+        </p:txBody>
+      </p:sp>
+      <p:cxnSp>
+        <p:nvCxnSpPr>
+          <p:cNvPr id="24" name="Gerade Verbindung mit Pfeil 23"/>
+          <p:cNvCxnSpPr/>
+          <p:nvPr/>
+        </p:nvCxnSpPr>
+        <p:spPr>
+          <a:xfrm>
+            <a:off x="2554087" y="4526636"/>
+            <a:ext cx="3192372" cy="0"/>
+          </a:xfrm>
+          <a:prstGeom prst="straightConnector1">
+            <a:avLst/>
+          </a:prstGeom>
+          <a:ln w="19050">
+            <a:solidFill>
+              <a:schemeClr val="tx1"/>
+            </a:solidFill>
+            <a:tailEnd type="triangle" w="lg" len="lg"/>
+          </a:ln>
+        </p:spPr>
+        <p:style>
+          <a:lnRef idx="1">
+            <a:schemeClr val="accent1"/>
+          </a:lnRef>
+          <a:fillRef idx="0">
+            <a:schemeClr val="accent1"/>
+          </a:fillRef>
+          <a:effectRef idx="0">
+            <a:schemeClr val="accent1"/>
+          </a:effectRef>
+          <a:fontRef idx="minor">
+            <a:schemeClr val="tx1"/>
+          </a:fontRef>
+        </p:style>
+      </p:cxnSp>
+      <p:sp>
+        <p:nvSpPr>
+          <p:cNvPr id="25" name="Textfeld 24"/>
+          <p:cNvSpPr txBox="1"/>
+          <p:nvPr/>
+        </p:nvSpPr>
+        <p:spPr>
+          <a:xfrm>
+            <a:off x="2890466" y="4144048"/>
+            <a:ext cx="3268275" cy="369332"/>
+          </a:xfrm>
+          <a:prstGeom prst="rect">
+            <a:avLst/>
+          </a:prstGeom>
+          <a:noFill/>
+        </p:spPr>
+        <p:txBody>
+          <a:bodyPr wrap="square" rtlCol="0">
+            <a:spAutoFit/>
+          </a:bodyPr>
+          <a:lstStyle/>
+          <a:p>
+            <a:r>
+              <a:rPr lang="de-DE" noProof="1" smtClean="0"/>
+              <a:t>RRC Connection Request</a:t>
+            </a:r>
+            <a:endParaRPr lang="de-DE" noProof="1"/>
+          </a:p>
+        </p:txBody>
+      </p:sp>
+      <p:sp>
+        <p:nvSpPr>
+          <p:cNvPr id="31" name="Rechteck 30"/>
           <p:cNvSpPr/>
           <p:nvPr/>
         </p:nvSpPr>
         <p:spPr>
           <a:xfrm>
-            <a:off x="2775635" y="1048265"/>
-            <a:ext cx="2423987" cy="1526059"/>
-          </a:xfrm>
-          <a:prstGeom prst="curvedDownArrow">
-            <a:avLst>
-              <a:gd name="adj1" fmla="val 25000"/>
-              <a:gd name="adj2" fmla="val 53265"/>
-              <a:gd name="adj3" fmla="val 25000"/>
-            </a:avLst>
+            <a:off x="2390400" y="1558521"/>
+            <a:ext cx="45719" cy="532078"/>
+          </a:xfrm>
+          <a:prstGeom prst="rect">
+            <a:avLst/>
+          </a:prstGeom>
+          <a:ln>
+            <a:solidFill>
+              <a:schemeClr val="bg1"/>
+            </a:solidFill>
+          </a:ln>
+        </p:spPr>
+        <p:style>
+          <a:lnRef idx="2">
+            <a:schemeClr val="accent3">
+              <a:shade val="50000"/>
+            </a:schemeClr>
+          </a:lnRef>
+          <a:fillRef idx="1">
+            <a:schemeClr val="accent3"/>
+          </a:fillRef>
+          <a:effectRef idx="0">
+            <a:schemeClr val="accent3"/>
+          </a:effectRef>
+          <a:fontRef idx="minor">
+            <a:schemeClr val="lt1"/>
+          </a:fontRef>
+        </p:style>
+        <p:txBody>
+          <a:bodyPr rtlCol="0" anchor="ctr"/>
+          <a:lstStyle/>
+          <a:p>
+            <a:pPr algn="ctr"/>
+            <a:endParaRPr lang="de-DE"/>
+          </a:p>
+        </p:txBody>
+      </p:sp>
+      <p:sp>
+        <p:nvSpPr>
+          <p:cNvPr id="33" name="Textfeld 32"/>
+          <p:cNvSpPr txBox="1"/>
+          <p:nvPr/>
+        </p:nvSpPr>
+        <p:spPr>
+          <a:xfrm>
+            <a:off x="453762" y="1639894"/>
+            <a:ext cx="1948746" cy="369332"/>
+          </a:xfrm>
+          <a:prstGeom prst="rect">
+            <a:avLst/>
+          </a:prstGeom>
+          <a:noFill/>
+        </p:spPr>
+        <p:txBody>
+          <a:bodyPr wrap="square" rtlCol="0">
+            <a:spAutoFit/>
+          </a:bodyPr>
+          <a:lstStyle/>
+          <a:p>
+            <a:pPr algn="r"/>
+            <a:r>
+              <a:rPr lang="de-DE" noProof="1" smtClean="0"/>
+              <a:t>Cell Configuration</a:t>
+            </a:r>
+            <a:endParaRPr lang="de-DE" noProof="1"/>
+          </a:p>
+        </p:txBody>
+      </p:sp>
+      <p:sp>
+        <p:nvSpPr>
+          <p:cNvPr id="34" name="Rechteck 33"/>
+          <p:cNvSpPr/>
+          <p:nvPr/>
+        </p:nvSpPr>
+        <p:spPr>
+          <a:xfrm>
+            <a:off x="2388529" y="3670149"/>
+            <a:ext cx="46800" cy="540000"/>
+          </a:xfrm>
+          <a:prstGeom prst="rect">
+            <a:avLst/>
+          </a:prstGeom>
+          <a:solidFill>
+            <a:srgbClr val="00B050"/>
+          </a:solidFill>
+          <a:ln>
+            <a:solidFill>
+              <a:schemeClr val="bg1"/>
+            </a:solidFill>
+          </a:ln>
+        </p:spPr>
+        <p:style>
+          <a:lnRef idx="2">
+            <a:schemeClr val="accent3">
+              <a:shade val="50000"/>
+            </a:schemeClr>
+          </a:lnRef>
+          <a:fillRef idx="1">
+            <a:schemeClr val="accent3"/>
+          </a:fillRef>
+          <a:effectRef idx="0">
+            <a:schemeClr val="accent3"/>
+          </a:effectRef>
+          <a:fontRef idx="minor">
+            <a:schemeClr val="lt1"/>
+          </a:fontRef>
+        </p:style>
+        <p:txBody>
+          <a:bodyPr rtlCol="0" anchor="ctr"/>
+          <a:lstStyle/>
+          <a:p>
+            <a:pPr algn="ctr"/>
+            <a:endParaRPr lang="de-DE"/>
+          </a:p>
+        </p:txBody>
+      </p:sp>
+      <p:sp>
+        <p:nvSpPr>
+          <p:cNvPr id="35" name="Textfeld 34"/>
+          <p:cNvSpPr txBox="1"/>
+          <p:nvPr/>
+        </p:nvSpPr>
+        <p:spPr>
+          <a:xfrm>
+            <a:off x="453762" y="3755483"/>
+            <a:ext cx="1948746" cy="369332"/>
+          </a:xfrm>
+          <a:prstGeom prst="rect">
+            <a:avLst/>
+          </a:prstGeom>
+          <a:noFill/>
+        </p:spPr>
+        <p:txBody>
+          <a:bodyPr wrap="square" rtlCol="0">
+            <a:spAutoFit/>
+          </a:bodyPr>
+          <a:lstStyle/>
+          <a:p>
+            <a:pPr algn="r"/>
+            <a:r>
+              <a:rPr lang="de-DE" noProof="1" smtClean="0"/>
+              <a:t>Random Access</a:t>
+            </a:r>
+            <a:endParaRPr lang="de-DE" noProof="1"/>
+          </a:p>
+        </p:txBody>
+      </p:sp>
+      <p:sp>
+        <p:nvSpPr>
+          <p:cNvPr id="36" name="Textfeld 35"/>
+          <p:cNvSpPr txBox="1"/>
+          <p:nvPr/>
+        </p:nvSpPr>
+        <p:spPr>
+          <a:xfrm>
+            <a:off x="2097216" y="884067"/>
+            <a:ext cx="971551" cy="369332"/>
+          </a:xfrm>
+          <a:prstGeom prst="rect">
+            <a:avLst/>
+          </a:prstGeom>
+          <a:noFill/>
+        </p:spPr>
+        <p:txBody>
+          <a:bodyPr wrap="square" rtlCol="0">
+            <a:spAutoFit/>
+          </a:bodyPr>
+          <a:lstStyle/>
+          <a:p>
+            <a:pPr algn="ctr"/>
+            <a:r>
+              <a:rPr lang="de-DE" noProof="1" smtClean="0"/>
+              <a:t>UE</a:t>
+            </a:r>
+            <a:endParaRPr lang="de-DE" noProof="1"/>
+          </a:p>
+        </p:txBody>
+      </p:sp>
+      <p:sp>
+        <p:nvSpPr>
+          <p:cNvPr id="37" name="Textfeld 36"/>
+          <p:cNvSpPr txBox="1"/>
+          <p:nvPr/>
+        </p:nvSpPr>
+        <p:spPr>
+          <a:xfrm>
+            <a:off x="5668311" y="877812"/>
+            <a:ext cx="971551" cy="369332"/>
+          </a:xfrm>
+          <a:prstGeom prst="rect">
+            <a:avLst/>
+          </a:prstGeom>
+          <a:noFill/>
+        </p:spPr>
+        <p:txBody>
+          <a:bodyPr wrap="square" rtlCol="0">
+            <a:spAutoFit/>
+          </a:bodyPr>
+          <a:lstStyle/>
+          <a:p>
+            <a:pPr algn="ctr"/>
+            <a:r>
+              <a:rPr lang="de-DE" noProof="1" smtClean="0"/>
+              <a:t>eNodeB</a:t>
+            </a:r>
+            <a:endParaRPr lang="de-DE" noProof="1"/>
+          </a:p>
+        </p:txBody>
+      </p:sp>
+      <p:sp>
+        <p:nvSpPr>
+          <p:cNvPr id="38" name="Rechteck 37"/>
+          <p:cNvSpPr/>
+          <p:nvPr/>
+        </p:nvSpPr>
+        <p:spPr>
+          <a:xfrm>
+            <a:off x="2390400" y="4261302"/>
+            <a:ext cx="45719" cy="900000"/>
+          </a:xfrm>
+          <a:prstGeom prst="rect">
+            <a:avLst/>
+          </a:prstGeom>
+          <a:solidFill>
+            <a:srgbClr val="FF0000"/>
+          </a:solidFill>
+          <a:ln>
+            <a:solidFill>
+              <a:schemeClr val="bg1"/>
+            </a:solidFill>
+          </a:ln>
+        </p:spPr>
+        <p:style>
+          <a:lnRef idx="2">
+            <a:schemeClr val="accent3">
+              <a:shade val="50000"/>
+            </a:schemeClr>
+          </a:lnRef>
+          <a:fillRef idx="1">
+            <a:schemeClr val="accent3"/>
+          </a:fillRef>
+          <a:effectRef idx="0">
+            <a:schemeClr val="accent3"/>
+          </a:effectRef>
+          <a:fontRef idx="minor">
+            <a:schemeClr val="lt1"/>
+          </a:fontRef>
+        </p:style>
+        <p:txBody>
+          <a:bodyPr rtlCol="0" anchor="ctr"/>
+          <a:lstStyle/>
+          <a:p>
+            <a:pPr algn="ctr"/>
+            <a:endParaRPr lang="de-DE"/>
+          </a:p>
+        </p:txBody>
+      </p:sp>
+      <p:sp>
+        <p:nvSpPr>
+          <p:cNvPr id="39" name="Textfeld 38"/>
+          <p:cNvSpPr txBox="1"/>
+          <p:nvPr/>
+        </p:nvSpPr>
+        <p:spPr>
+          <a:xfrm>
+            <a:off x="453762" y="4526636"/>
+            <a:ext cx="1948746" cy="369332"/>
+          </a:xfrm>
+          <a:prstGeom prst="rect">
+            <a:avLst/>
+          </a:prstGeom>
+          <a:noFill/>
+        </p:spPr>
+        <p:txBody>
+          <a:bodyPr wrap="square" rtlCol="0">
+            <a:spAutoFit/>
+          </a:bodyPr>
+          <a:lstStyle/>
+          <a:p>
+            <a:pPr algn="r"/>
+            <a:r>
+              <a:rPr lang="de-DE" noProof="1" smtClean="0"/>
+              <a:t>RRC Setup</a:t>
+            </a:r>
+            <a:endParaRPr lang="de-DE" noProof="1"/>
+          </a:p>
+        </p:txBody>
+      </p:sp>
+      <p:pic>
+        <p:nvPicPr>
+          <p:cNvPr id="40" name="Grafik 39"/>
+          <p:cNvPicPr>
+            <a:picLocks noChangeAspect="1"/>
+          </p:cNvPicPr>
+          <p:nvPr/>
+        </p:nvPicPr>
+        <p:blipFill>
+          <a:blip r:embed="rId2"/>
+          <a:stretch>
+            <a:fillRect/>
+          </a:stretch>
+        </p:blipFill>
+        <p:spPr>
+          <a:xfrm>
+            <a:off x="2388530" y="65155"/>
+            <a:ext cx="524211" cy="720000"/>
+          </a:xfrm>
+          <a:prstGeom prst="rect">
+            <a:avLst/>
+          </a:prstGeom>
+        </p:spPr>
+      </p:pic>
+      <p:pic>
+        <p:nvPicPr>
+          <p:cNvPr id="41" name="Grafik 40"/>
+          <p:cNvPicPr>
+            <a:picLocks noChangeAspect="1"/>
+          </p:cNvPicPr>
+          <p:nvPr/>
+        </p:nvPicPr>
+        <p:blipFill>
+          <a:blip r:embed="rId3" cstate="print">
+            <a:extLst>
+              <a:ext uri="{28A0092B-C50C-407E-A947-70E740481C1C}">
+                <a14:useLocalDpi xmlns:a14="http://schemas.microsoft.com/office/drawing/2010/main" val="0"/>
+              </a:ext>
+            </a:extLst>
+          </a:blip>
+          <a:stretch>
+            <a:fillRect/>
+          </a:stretch>
+        </p:blipFill>
+        <p:spPr>
+          <a:xfrm>
+            <a:off x="5826642" y="190867"/>
+            <a:ext cx="720000" cy="720000"/>
+          </a:xfrm>
+          <a:prstGeom prst="rect">
+            <a:avLst/>
+          </a:prstGeom>
+        </p:spPr>
+      </p:pic>
+      <p:pic>
+        <p:nvPicPr>
+          <p:cNvPr id="28" name="Grafik 27"/>
+          <p:cNvPicPr>
+            <a:picLocks noChangeAspect="1"/>
+          </p:cNvPicPr>
+          <p:nvPr/>
+        </p:nvPicPr>
+        <p:blipFill>
+          <a:blip r:embed="rId4" cstate="print">
+            <a:extLst>
+              <a:ext uri="{28A0092B-C50C-407E-A947-70E740481C1C}">
+                <a14:useLocalDpi xmlns:a14="http://schemas.microsoft.com/office/drawing/2010/main" val="0"/>
+              </a:ext>
+            </a:extLst>
+          </a:blip>
+          <a:stretch>
+            <a:fillRect/>
+          </a:stretch>
+        </p:blipFill>
+        <p:spPr>
+          <a:xfrm rot="4419845">
+            <a:off x="5324267" y="4200194"/>
+            <a:ext cx="688087" cy="843199"/>
+          </a:xfrm>
+          <a:prstGeom prst="rect">
+            <a:avLst/>
+          </a:prstGeom>
+        </p:spPr>
+      </p:pic>
+    </p:spTree>
+    <p:extLst>
+      <p:ext uri="{BB962C8B-B14F-4D97-AF65-F5344CB8AC3E}">
+        <p14:creationId xmlns:p14="http://schemas.microsoft.com/office/powerpoint/2010/main" val="977096733"/>
+      </p:ext>
+    </p:extLst>
+  </p:cSld>
+  <p:clrMapOvr>
+    <a:masterClrMapping/>
+  </p:clrMapOvr>
+</p:sld>
+</file>
+
+<file path=ppt/slides/slide4.xml><?xml version="1.0" encoding="utf-8"?>
+<p:sld xmlns:a="http://schemas.openxmlformats.org/drawingml/2006/main" xmlns:r="http://schemas.openxmlformats.org/officeDocument/2006/relationships" xmlns:p="http://schemas.openxmlformats.org/presentationml/2006/main">
+  <p:cSld>
+    <p:spTree>
+      <p:nvGrpSpPr>
+        <p:cNvPr id="1" name=""/>
+        <p:cNvGrpSpPr/>
+        <p:nvPr/>
+      </p:nvGrpSpPr>
+      <p:grpSpPr>
+        <a:xfrm>
+          <a:off x="0" y="0"/>
+          <a:ext cx="0" cy="0"/>
+          <a:chOff x="0" y="0"/>
+          <a:chExt cx="0" cy="0"/>
+        </a:xfrm>
+      </p:grpSpPr>
+      <p:cxnSp>
+        <p:nvCxnSpPr>
+          <p:cNvPr id="5" name="Gerader Verbinder 4"/>
+          <p:cNvCxnSpPr/>
+          <p:nvPr/>
+        </p:nvCxnSpPr>
+        <p:spPr>
+          <a:xfrm flipH="1">
+            <a:off x="2567128" y="1247144"/>
+            <a:ext cx="0" cy="5519956"/>
+          </a:xfrm>
+          <a:prstGeom prst="line">
+            <a:avLst/>
+          </a:prstGeom>
+          <a:ln w="19050">
+            <a:solidFill>
+              <a:schemeClr val="bg1">
+                <a:lumMod val="65000"/>
+              </a:schemeClr>
+            </a:solidFill>
+            <a:prstDash val="lgDash"/>
+          </a:ln>
+        </p:spPr>
+        <p:style>
+          <a:lnRef idx="1">
+            <a:schemeClr val="accent1"/>
+          </a:lnRef>
+          <a:fillRef idx="0">
+            <a:schemeClr val="accent1"/>
+          </a:fillRef>
+          <a:effectRef idx="0">
+            <a:schemeClr val="accent1"/>
+          </a:effectRef>
+          <a:fontRef idx="minor">
+            <a:schemeClr val="tx1"/>
+          </a:fontRef>
+        </p:style>
+      </p:cxnSp>
+      <p:cxnSp>
+        <p:nvCxnSpPr>
+          <p:cNvPr id="6" name="Gerader Verbinder 5"/>
+          <p:cNvCxnSpPr/>
+          <p:nvPr/>
+        </p:nvCxnSpPr>
+        <p:spPr>
+          <a:xfrm flipH="1">
+            <a:off x="6154088" y="1247144"/>
+            <a:ext cx="0" cy="5519956"/>
+          </a:xfrm>
+          <a:prstGeom prst="line">
+            <a:avLst/>
+          </a:prstGeom>
+          <a:ln w="19050">
+            <a:solidFill>
+              <a:schemeClr val="bg1">
+                <a:lumMod val="75000"/>
+              </a:schemeClr>
+            </a:solidFill>
+            <a:prstDash val="lgDash"/>
+          </a:ln>
+        </p:spPr>
+        <p:style>
+          <a:lnRef idx="1">
+            <a:schemeClr val="accent1"/>
+          </a:lnRef>
+          <a:fillRef idx="0">
+            <a:schemeClr val="accent1"/>
+          </a:fillRef>
+          <a:effectRef idx="0">
+            <a:schemeClr val="accent1"/>
+          </a:effectRef>
+          <a:fontRef idx="minor">
+            <a:schemeClr val="tx1"/>
+          </a:fontRef>
+        </p:style>
+      </p:cxnSp>
+      <p:cxnSp>
+        <p:nvCxnSpPr>
+          <p:cNvPr id="8" name="Gerade Verbindung mit Pfeil 7"/>
+          <p:cNvCxnSpPr/>
+          <p:nvPr/>
+        </p:nvCxnSpPr>
+        <p:spPr>
+          <a:xfrm flipH="1">
+            <a:off x="2567129" y="1661814"/>
+            <a:ext cx="3586959" cy="0"/>
+          </a:xfrm>
+          <a:prstGeom prst="straightConnector1">
+            <a:avLst/>
+          </a:prstGeom>
+          <a:ln w="19050">
+            <a:solidFill>
+              <a:srgbClr val="FF0000"/>
+            </a:solidFill>
+            <a:tailEnd type="triangle" w="lg" len="lg"/>
+          </a:ln>
+        </p:spPr>
+        <p:style>
+          <a:lnRef idx="1">
+            <a:schemeClr val="accent1"/>
+          </a:lnRef>
+          <a:fillRef idx="0">
+            <a:schemeClr val="accent1"/>
+          </a:fillRef>
+          <a:effectRef idx="0">
+            <a:schemeClr val="accent1"/>
+          </a:effectRef>
+          <a:fontRef idx="minor">
+            <a:schemeClr val="tx1"/>
+          </a:fontRef>
+        </p:style>
+      </p:cxnSp>
+      <p:sp>
+        <p:nvSpPr>
+          <p:cNvPr id="9" name="Textfeld 8"/>
+          <p:cNvSpPr txBox="1"/>
+          <p:nvPr/>
+        </p:nvSpPr>
+        <p:spPr>
+          <a:xfrm>
+            <a:off x="2971571" y="1292482"/>
+            <a:ext cx="3195560" cy="369332"/>
+          </a:xfrm>
+          <a:prstGeom prst="rect">
+            <a:avLst/>
+          </a:prstGeom>
+          <a:noFill/>
+        </p:spPr>
+        <p:txBody>
+          <a:bodyPr wrap="square" rtlCol="0">
+            <a:spAutoFit/>
+          </a:bodyPr>
+          <a:lstStyle/>
+          <a:p>
+            <a:r>
+              <a:rPr lang="de-DE" noProof="1" smtClean="0"/>
+              <a:t>Reference Signal, PSS, SSS</a:t>
+            </a:r>
+            <a:endParaRPr lang="de-DE" noProof="1"/>
+          </a:p>
+        </p:txBody>
+      </p:sp>
+      <p:cxnSp>
+        <p:nvCxnSpPr>
+          <p:cNvPr id="11" name="Gerade Verbindung mit Pfeil 10"/>
+          <p:cNvCxnSpPr/>
+          <p:nvPr/>
+        </p:nvCxnSpPr>
+        <p:spPr>
+          <a:xfrm flipH="1">
+            <a:off x="2582992" y="1988752"/>
+            <a:ext cx="3600000" cy="0"/>
+          </a:xfrm>
+          <a:prstGeom prst="straightConnector1">
+            <a:avLst/>
+          </a:prstGeom>
+          <a:ln w="19050">
+            <a:solidFill>
+              <a:srgbClr val="FF0000"/>
+            </a:solidFill>
+            <a:tailEnd type="triangle" w="lg" len="lg"/>
+          </a:ln>
+        </p:spPr>
+        <p:style>
+          <a:lnRef idx="1">
+            <a:schemeClr val="accent1"/>
+          </a:lnRef>
+          <a:fillRef idx="0">
+            <a:schemeClr val="accent1"/>
+          </a:fillRef>
+          <a:effectRef idx="0">
+            <a:schemeClr val="accent1"/>
+          </a:effectRef>
+          <a:fontRef idx="minor">
+            <a:schemeClr val="tx1"/>
+          </a:fontRef>
+        </p:style>
+      </p:cxnSp>
+      <p:cxnSp>
+        <p:nvCxnSpPr>
+          <p:cNvPr id="12" name="Gerade Verbindung mit Pfeil 11"/>
+          <p:cNvCxnSpPr/>
+          <p:nvPr/>
+        </p:nvCxnSpPr>
+        <p:spPr>
+          <a:xfrm>
+            <a:off x="2582992" y="3770808"/>
+            <a:ext cx="3600000" cy="0"/>
+          </a:xfrm>
+          <a:prstGeom prst="straightConnector1">
+            <a:avLst/>
+          </a:prstGeom>
+          <a:ln w="19050">
+            <a:solidFill>
+              <a:schemeClr val="tx1"/>
+            </a:solidFill>
+            <a:tailEnd type="triangle" w="lg" len="lg"/>
+          </a:ln>
+        </p:spPr>
+        <p:style>
+          <a:lnRef idx="1">
+            <a:schemeClr val="accent1"/>
+          </a:lnRef>
+          <a:fillRef idx="0">
+            <a:schemeClr val="accent1"/>
+          </a:fillRef>
+          <a:effectRef idx="0">
+            <a:schemeClr val="accent1"/>
+          </a:effectRef>
+          <a:fontRef idx="minor">
+            <a:schemeClr val="tx1"/>
+          </a:fontRef>
+        </p:style>
+      </p:cxnSp>
+      <p:sp>
+        <p:nvSpPr>
+          <p:cNvPr id="17" name="Textfeld 16"/>
+          <p:cNvSpPr txBox="1"/>
+          <p:nvPr/>
+        </p:nvSpPr>
+        <p:spPr>
+          <a:xfrm>
+            <a:off x="2971570" y="1639894"/>
+            <a:ext cx="3182517" cy="369332"/>
+          </a:xfrm>
+          <a:prstGeom prst="rect">
+            <a:avLst/>
+          </a:prstGeom>
+          <a:noFill/>
+        </p:spPr>
+        <p:txBody>
+          <a:bodyPr wrap="square" rtlCol="0">
+            <a:spAutoFit/>
+          </a:bodyPr>
+          <a:lstStyle/>
+          <a:p>
+            <a:r>
+              <a:rPr lang="de-DE" noProof="1" smtClean="0"/>
+              <a:t>MIB, SIB 1, SIB2, …</a:t>
+            </a:r>
+            <a:endParaRPr lang="de-DE" noProof="1"/>
+          </a:p>
+        </p:txBody>
+      </p:sp>
+      <p:sp>
+        <p:nvSpPr>
+          <p:cNvPr id="19" name="Textfeld 18"/>
+          <p:cNvSpPr txBox="1"/>
+          <p:nvPr/>
+        </p:nvSpPr>
+        <p:spPr>
+          <a:xfrm>
+            <a:off x="2891468" y="3396784"/>
+            <a:ext cx="3268274" cy="369332"/>
+          </a:xfrm>
+          <a:prstGeom prst="rect">
+            <a:avLst/>
+          </a:prstGeom>
+          <a:noFill/>
+        </p:spPr>
+        <p:txBody>
+          <a:bodyPr wrap="square" rtlCol="0">
+            <a:spAutoFit/>
+          </a:bodyPr>
+          <a:lstStyle/>
+          <a:p>
+            <a:r>
+              <a:rPr lang="de-DE" noProof="1" smtClean="0"/>
+              <a:t>PRACH Preamble</a:t>
+            </a:r>
+            <a:endParaRPr lang="de-DE" noProof="1"/>
+          </a:p>
+        </p:txBody>
+      </p:sp>
+      <p:cxnSp>
+        <p:nvCxnSpPr>
+          <p:cNvPr id="20" name="Gerade Verbindung mit Pfeil 19"/>
+          <p:cNvCxnSpPr/>
+          <p:nvPr/>
+        </p:nvCxnSpPr>
+        <p:spPr>
+          <a:xfrm flipH="1">
+            <a:off x="2567130" y="4144833"/>
+            <a:ext cx="3600000" cy="0"/>
+          </a:xfrm>
+          <a:prstGeom prst="straightConnector1">
+            <a:avLst/>
+          </a:prstGeom>
+          <a:ln w="19050">
+            <a:solidFill>
+              <a:schemeClr val="tx1"/>
+            </a:solidFill>
+            <a:tailEnd type="triangle" w="lg" len="lg"/>
+          </a:ln>
+        </p:spPr>
+        <p:style>
+          <a:lnRef idx="1">
+            <a:schemeClr val="accent1"/>
+          </a:lnRef>
+          <a:fillRef idx="0">
+            <a:schemeClr val="accent1"/>
+          </a:fillRef>
+          <a:effectRef idx="0">
+            <a:schemeClr val="accent1"/>
+          </a:effectRef>
+          <a:fontRef idx="minor">
+            <a:schemeClr val="tx1"/>
+          </a:fontRef>
+        </p:style>
+      </p:cxnSp>
+      <p:sp>
+        <p:nvSpPr>
+          <p:cNvPr id="21" name="Textfeld 20"/>
+          <p:cNvSpPr txBox="1"/>
+          <p:nvPr/>
+        </p:nvSpPr>
+        <p:spPr>
+          <a:xfrm>
+            <a:off x="2885814" y="3770808"/>
+            <a:ext cx="3268274" cy="369332"/>
+          </a:xfrm>
+          <a:prstGeom prst="rect">
+            <a:avLst/>
+          </a:prstGeom>
+          <a:noFill/>
+        </p:spPr>
+        <p:txBody>
+          <a:bodyPr wrap="square" rtlCol="0">
+            <a:spAutoFit/>
+          </a:bodyPr>
+          <a:lstStyle/>
+          <a:p>
+            <a:r>
+              <a:rPr lang="de-DE" noProof="1" smtClean="0"/>
+              <a:t>PRACH Preamble Response</a:t>
+            </a:r>
+            <a:endParaRPr lang="de-DE" noProof="1"/>
+          </a:p>
+        </p:txBody>
+      </p:sp>
+      <p:cxnSp>
+        <p:nvCxnSpPr>
+          <p:cNvPr id="22" name="Gerade Verbindung mit Pfeil 21"/>
+          <p:cNvCxnSpPr/>
+          <p:nvPr/>
+        </p:nvCxnSpPr>
+        <p:spPr>
+          <a:xfrm flipH="1">
+            <a:off x="2567130" y="4903883"/>
+            <a:ext cx="3600000" cy="0"/>
+          </a:xfrm>
+          <a:prstGeom prst="straightConnector1">
+            <a:avLst/>
+          </a:prstGeom>
+          <a:ln w="19050">
+            <a:solidFill>
+              <a:schemeClr val="tx1"/>
+            </a:solidFill>
+            <a:tailEnd type="triangle" w="lg" len="lg"/>
+          </a:ln>
+        </p:spPr>
+        <p:style>
+          <a:lnRef idx="1">
+            <a:schemeClr val="accent1"/>
+          </a:lnRef>
+          <a:fillRef idx="0">
+            <a:schemeClr val="accent1"/>
+          </a:fillRef>
+          <a:effectRef idx="0">
+            <a:schemeClr val="accent1"/>
+          </a:effectRef>
+          <a:fontRef idx="minor">
+            <a:schemeClr val="tx1"/>
+          </a:fontRef>
+        </p:style>
+      </p:cxnSp>
+      <p:sp>
+        <p:nvSpPr>
+          <p:cNvPr id="23" name="Textfeld 22"/>
+          <p:cNvSpPr txBox="1"/>
+          <p:nvPr/>
+        </p:nvSpPr>
+        <p:spPr>
+          <a:xfrm>
+            <a:off x="2885813" y="4526636"/>
+            <a:ext cx="3281317" cy="369332"/>
+          </a:xfrm>
+          <a:prstGeom prst="rect">
+            <a:avLst/>
+          </a:prstGeom>
+          <a:noFill/>
+        </p:spPr>
+        <p:txBody>
+          <a:bodyPr wrap="square" rtlCol="0">
+            <a:spAutoFit/>
+          </a:bodyPr>
+          <a:lstStyle/>
+          <a:p>
+            <a:r>
+              <a:rPr lang="de-DE" noProof="1" smtClean="0"/>
+              <a:t>RRC Connection Setup</a:t>
+            </a:r>
+            <a:endParaRPr lang="de-DE" noProof="1"/>
+          </a:p>
+        </p:txBody>
+      </p:sp>
+      <p:cxnSp>
+        <p:nvCxnSpPr>
+          <p:cNvPr id="24" name="Gerade Verbindung mit Pfeil 23"/>
+          <p:cNvCxnSpPr/>
+          <p:nvPr/>
+        </p:nvCxnSpPr>
+        <p:spPr>
+          <a:xfrm>
+            <a:off x="2554087" y="4526636"/>
+            <a:ext cx="3600000" cy="0"/>
+          </a:xfrm>
+          <a:prstGeom prst="straightConnector1">
+            <a:avLst/>
+          </a:prstGeom>
+          <a:ln w="19050">
+            <a:solidFill>
+              <a:schemeClr val="tx1"/>
+            </a:solidFill>
+            <a:tailEnd type="triangle" w="lg" len="lg"/>
+          </a:ln>
+        </p:spPr>
+        <p:style>
+          <a:lnRef idx="1">
+            <a:schemeClr val="accent1"/>
+          </a:lnRef>
+          <a:fillRef idx="0">
+            <a:schemeClr val="accent1"/>
+          </a:fillRef>
+          <a:effectRef idx="0">
+            <a:schemeClr val="accent1"/>
+          </a:effectRef>
+          <a:fontRef idx="minor">
+            <a:schemeClr val="tx1"/>
+          </a:fontRef>
+        </p:style>
+      </p:cxnSp>
+      <p:sp>
+        <p:nvSpPr>
+          <p:cNvPr id="25" name="Textfeld 24"/>
+          <p:cNvSpPr txBox="1"/>
+          <p:nvPr/>
+        </p:nvSpPr>
+        <p:spPr>
+          <a:xfrm>
+            <a:off x="2890466" y="4144048"/>
+            <a:ext cx="3268275" cy="369332"/>
+          </a:xfrm>
+          <a:prstGeom prst="rect">
+            <a:avLst/>
+          </a:prstGeom>
+          <a:noFill/>
+        </p:spPr>
+        <p:txBody>
+          <a:bodyPr wrap="square" rtlCol="0">
+            <a:spAutoFit/>
+          </a:bodyPr>
+          <a:lstStyle/>
+          <a:p>
+            <a:r>
+              <a:rPr lang="de-DE" noProof="1" smtClean="0"/>
+              <a:t>RRC Connection Request</a:t>
+            </a:r>
+            <a:endParaRPr lang="de-DE" noProof="1"/>
+          </a:p>
+        </p:txBody>
+      </p:sp>
+      <p:cxnSp>
+        <p:nvCxnSpPr>
+          <p:cNvPr id="29" name="Gerade Verbindung mit Pfeil 28"/>
+          <p:cNvCxnSpPr/>
+          <p:nvPr/>
+        </p:nvCxnSpPr>
+        <p:spPr>
+          <a:xfrm>
+            <a:off x="2582992" y="5307095"/>
+            <a:ext cx="3600000" cy="0"/>
+          </a:xfrm>
+          <a:prstGeom prst="straightConnector1">
+            <a:avLst/>
+          </a:prstGeom>
+          <a:ln w="19050">
+            <a:solidFill>
+              <a:schemeClr val="tx1"/>
+            </a:solidFill>
+            <a:tailEnd type="triangle" w="lg" len="lg"/>
+          </a:ln>
+        </p:spPr>
+        <p:style>
+          <a:lnRef idx="1">
+            <a:schemeClr val="accent1"/>
+          </a:lnRef>
+          <a:fillRef idx="0">
+            <a:schemeClr val="accent1"/>
+          </a:fillRef>
+          <a:effectRef idx="0">
+            <a:schemeClr val="accent1"/>
+          </a:effectRef>
+          <a:fontRef idx="minor">
+            <a:schemeClr val="tx1"/>
+          </a:fontRef>
+        </p:style>
+      </p:cxnSp>
+      <p:sp>
+        <p:nvSpPr>
+          <p:cNvPr id="30" name="Textfeld 29"/>
+          <p:cNvSpPr txBox="1"/>
+          <p:nvPr/>
+        </p:nvSpPr>
+        <p:spPr>
+          <a:xfrm>
+            <a:off x="2892333" y="4936140"/>
+            <a:ext cx="3268275" cy="369332"/>
+          </a:xfrm>
+          <a:prstGeom prst="rect">
+            <a:avLst/>
+          </a:prstGeom>
+          <a:noFill/>
+        </p:spPr>
+        <p:txBody>
+          <a:bodyPr wrap="square" rtlCol="0">
+            <a:spAutoFit/>
+          </a:bodyPr>
+          <a:lstStyle/>
+          <a:p>
+            <a:r>
+              <a:rPr lang="de-DE" noProof="1" smtClean="0"/>
+              <a:t>RRC Connection Setup Complete</a:t>
+            </a:r>
+            <a:endParaRPr lang="de-DE" noProof="1"/>
+          </a:p>
+        </p:txBody>
+      </p:sp>
+      <p:sp>
+        <p:nvSpPr>
+          <p:cNvPr id="31" name="Rechteck 30"/>
+          <p:cNvSpPr/>
+          <p:nvPr/>
+        </p:nvSpPr>
+        <p:spPr>
+          <a:xfrm>
+            <a:off x="2390400" y="1558521"/>
+            <a:ext cx="45719" cy="532078"/>
+          </a:xfrm>
+          <a:prstGeom prst="rect">
+            <a:avLst/>
+          </a:prstGeom>
+          <a:ln>
+            <a:solidFill>
+              <a:schemeClr val="bg1"/>
+            </a:solidFill>
+          </a:ln>
+        </p:spPr>
+        <p:style>
+          <a:lnRef idx="2">
+            <a:schemeClr val="accent3">
+              <a:shade val="50000"/>
+            </a:schemeClr>
+          </a:lnRef>
+          <a:fillRef idx="1">
+            <a:schemeClr val="accent3"/>
+          </a:fillRef>
+          <a:effectRef idx="0">
+            <a:schemeClr val="accent3"/>
+          </a:effectRef>
+          <a:fontRef idx="minor">
+            <a:schemeClr val="lt1"/>
+          </a:fontRef>
+        </p:style>
+        <p:txBody>
+          <a:bodyPr rtlCol="0" anchor="ctr"/>
+          <a:lstStyle/>
+          <a:p>
+            <a:pPr algn="ctr"/>
+            <a:endParaRPr lang="de-DE"/>
+          </a:p>
+        </p:txBody>
+      </p:sp>
+      <p:sp>
+        <p:nvSpPr>
+          <p:cNvPr id="33" name="Textfeld 32"/>
+          <p:cNvSpPr txBox="1"/>
+          <p:nvPr/>
+        </p:nvSpPr>
+        <p:spPr>
+          <a:xfrm>
+            <a:off x="453762" y="1639894"/>
+            <a:ext cx="1948746" cy="369332"/>
+          </a:xfrm>
+          <a:prstGeom prst="rect">
+            <a:avLst/>
+          </a:prstGeom>
+          <a:noFill/>
+        </p:spPr>
+        <p:txBody>
+          <a:bodyPr wrap="square" rtlCol="0">
+            <a:spAutoFit/>
+          </a:bodyPr>
+          <a:lstStyle/>
+          <a:p>
+            <a:pPr algn="r"/>
+            <a:r>
+              <a:rPr lang="de-DE" noProof="1" smtClean="0"/>
+              <a:t>Cell Configuration</a:t>
+            </a:r>
+            <a:endParaRPr lang="de-DE" noProof="1"/>
+          </a:p>
+        </p:txBody>
+      </p:sp>
+      <p:sp>
+        <p:nvSpPr>
+          <p:cNvPr id="34" name="Rechteck 33"/>
+          <p:cNvSpPr/>
+          <p:nvPr/>
+        </p:nvSpPr>
+        <p:spPr>
+          <a:xfrm>
+            <a:off x="2388529" y="3670149"/>
+            <a:ext cx="46800" cy="540000"/>
+          </a:xfrm>
+          <a:prstGeom prst="rect">
+            <a:avLst/>
+          </a:prstGeom>
+          <a:solidFill>
+            <a:srgbClr val="00B050"/>
+          </a:solidFill>
+          <a:ln>
+            <a:solidFill>
+              <a:schemeClr val="bg1"/>
+            </a:solidFill>
+          </a:ln>
+        </p:spPr>
+        <p:style>
+          <a:lnRef idx="2">
+            <a:schemeClr val="accent3">
+              <a:shade val="50000"/>
+            </a:schemeClr>
+          </a:lnRef>
+          <a:fillRef idx="1">
+            <a:schemeClr val="accent3"/>
+          </a:fillRef>
+          <a:effectRef idx="0">
+            <a:schemeClr val="accent3"/>
+          </a:effectRef>
+          <a:fontRef idx="minor">
+            <a:schemeClr val="lt1"/>
+          </a:fontRef>
+        </p:style>
+        <p:txBody>
+          <a:bodyPr rtlCol="0" anchor="ctr"/>
+          <a:lstStyle/>
+          <a:p>
+            <a:pPr algn="ctr"/>
+            <a:endParaRPr lang="de-DE"/>
+          </a:p>
+        </p:txBody>
+      </p:sp>
+      <p:sp>
+        <p:nvSpPr>
+          <p:cNvPr id="35" name="Textfeld 34"/>
+          <p:cNvSpPr txBox="1"/>
+          <p:nvPr/>
+        </p:nvSpPr>
+        <p:spPr>
+          <a:xfrm>
+            <a:off x="453762" y="3755483"/>
+            <a:ext cx="1948746" cy="369332"/>
+          </a:xfrm>
+          <a:prstGeom prst="rect">
+            <a:avLst/>
+          </a:prstGeom>
+          <a:noFill/>
+        </p:spPr>
+        <p:txBody>
+          <a:bodyPr wrap="square" rtlCol="0">
+            <a:spAutoFit/>
+          </a:bodyPr>
+          <a:lstStyle/>
+          <a:p>
+            <a:pPr algn="r"/>
+            <a:r>
+              <a:rPr lang="de-DE" noProof="1" smtClean="0"/>
+              <a:t>Random Access</a:t>
+            </a:r>
+            <a:endParaRPr lang="de-DE" noProof="1"/>
+          </a:p>
+        </p:txBody>
+      </p:sp>
+      <p:sp>
+        <p:nvSpPr>
+          <p:cNvPr id="36" name="Textfeld 35"/>
+          <p:cNvSpPr txBox="1"/>
+          <p:nvPr/>
+        </p:nvSpPr>
+        <p:spPr>
+          <a:xfrm>
+            <a:off x="2097216" y="884067"/>
+            <a:ext cx="971551" cy="369332"/>
+          </a:xfrm>
+          <a:prstGeom prst="rect">
+            <a:avLst/>
+          </a:prstGeom>
+          <a:noFill/>
+        </p:spPr>
+        <p:txBody>
+          <a:bodyPr wrap="square" rtlCol="0">
+            <a:spAutoFit/>
+          </a:bodyPr>
+          <a:lstStyle/>
+          <a:p>
+            <a:pPr algn="ctr"/>
+            <a:r>
+              <a:rPr lang="de-DE" noProof="1" smtClean="0"/>
+              <a:t>UE</a:t>
+            </a:r>
+            <a:endParaRPr lang="de-DE" noProof="1"/>
+          </a:p>
+        </p:txBody>
+      </p:sp>
+      <p:sp>
+        <p:nvSpPr>
+          <p:cNvPr id="37" name="Textfeld 36"/>
+          <p:cNvSpPr txBox="1"/>
+          <p:nvPr/>
+        </p:nvSpPr>
+        <p:spPr>
+          <a:xfrm>
+            <a:off x="5668311" y="877812"/>
+            <a:ext cx="971551" cy="369332"/>
+          </a:xfrm>
+          <a:prstGeom prst="rect">
+            <a:avLst/>
+          </a:prstGeom>
+          <a:noFill/>
+        </p:spPr>
+        <p:txBody>
+          <a:bodyPr wrap="square" rtlCol="0">
+            <a:spAutoFit/>
+          </a:bodyPr>
+          <a:lstStyle/>
+          <a:p>
+            <a:pPr algn="ctr"/>
+            <a:r>
+              <a:rPr lang="de-DE" noProof="1" smtClean="0"/>
+              <a:t>eNodeB</a:t>
+            </a:r>
+            <a:endParaRPr lang="de-DE" noProof="1"/>
+          </a:p>
+        </p:txBody>
+      </p:sp>
+      <p:sp>
+        <p:nvSpPr>
+          <p:cNvPr id="38" name="Rechteck 37"/>
+          <p:cNvSpPr/>
+          <p:nvPr/>
+        </p:nvSpPr>
+        <p:spPr>
+          <a:xfrm>
+            <a:off x="2390400" y="4261302"/>
+            <a:ext cx="45719" cy="900000"/>
+          </a:xfrm>
+          <a:prstGeom prst="rect">
+            <a:avLst/>
+          </a:prstGeom>
+          <a:solidFill>
+            <a:srgbClr val="FF0000"/>
+          </a:solidFill>
+          <a:ln>
+            <a:solidFill>
+              <a:schemeClr val="bg1"/>
+            </a:solidFill>
+          </a:ln>
+        </p:spPr>
+        <p:style>
+          <a:lnRef idx="2">
+            <a:schemeClr val="accent3">
+              <a:shade val="50000"/>
+            </a:schemeClr>
+          </a:lnRef>
+          <a:fillRef idx="1">
+            <a:schemeClr val="accent3"/>
+          </a:fillRef>
+          <a:effectRef idx="0">
+            <a:schemeClr val="accent3"/>
+          </a:effectRef>
+          <a:fontRef idx="minor">
+            <a:schemeClr val="lt1"/>
+          </a:fontRef>
+        </p:style>
+        <p:txBody>
+          <a:bodyPr rtlCol="0" anchor="ctr"/>
+          <a:lstStyle/>
+          <a:p>
+            <a:pPr algn="ctr"/>
+            <a:endParaRPr lang="de-DE"/>
+          </a:p>
+        </p:txBody>
+      </p:sp>
+      <p:sp>
+        <p:nvSpPr>
+          <p:cNvPr id="39" name="Textfeld 38"/>
+          <p:cNvSpPr txBox="1"/>
+          <p:nvPr/>
+        </p:nvSpPr>
+        <p:spPr>
+          <a:xfrm>
+            <a:off x="453762" y="4526636"/>
+            <a:ext cx="1948746" cy="369332"/>
+          </a:xfrm>
+          <a:prstGeom prst="rect">
+            <a:avLst/>
+          </a:prstGeom>
+          <a:noFill/>
+        </p:spPr>
+        <p:txBody>
+          <a:bodyPr wrap="square" rtlCol="0">
+            <a:spAutoFit/>
+          </a:bodyPr>
+          <a:lstStyle/>
+          <a:p>
+            <a:pPr algn="r"/>
+            <a:r>
+              <a:rPr lang="de-DE" noProof="1" smtClean="0"/>
+              <a:t>RRC Setup</a:t>
+            </a:r>
+            <a:endParaRPr lang="de-DE" noProof="1"/>
+          </a:p>
+        </p:txBody>
+      </p:sp>
+      <p:pic>
+        <p:nvPicPr>
+          <p:cNvPr id="40" name="Grafik 39"/>
+          <p:cNvPicPr>
+            <a:picLocks noChangeAspect="1"/>
+          </p:cNvPicPr>
+          <p:nvPr/>
+        </p:nvPicPr>
+        <p:blipFill>
+          <a:blip r:embed="rId2"/>
+          <a:stretch>
+            <a:fillRect/>
+          </a:stretch>
+        </p:blipFill>
+        <p:spPr>
+          <a:xfrm>
+            <a:off x="2388530" y="65155"/>
+            <a:ext cx="524211" cy="720000"/>
+          </a:xfrm>
+          <a:prstGeom prst="rect">
+            <a:avLst/>
+          </a:prstGeom>
+        </p:spPr>
+      </p:pic>
+      <p:pic>
+        <p:nvPicPr>
+          <p:cNvPr id="41" name="Grafik 40"/>
+          <p:cNvPicPr>
+            <a:picLocks noChangeAspect="1"/>
+          </p:cNvPicPr>
+          <p:nvPr/>
+        </p:nvPicPr>
+        <p:blipFill>
+          <a:blip r:embed="rId3" cstate="print">
+            <a:extLst>
+              <a:ext uri="{28A0092B-C50C-407E-A947-70E740481C1C}">
+                <a14:useLocalDpi xmlns:a14="http://schemas.microsoft.com/office/drawing/2010/main" val="0"/>
+              </a:ext>
+            </a:extLst>
+          </a:blip>
+          <a:stretch>
+            <a:fillRect/>
+          </a:stretch>
+        </p:blipFill>
+        <p:spPr>
+          <a:xfrm>
+            <a:off x="5826642" y="190867"/>
+            <a:ext cx="720000" cy="720000"/>
+          </a:xfrm>
+          <a:prstGeom prst="rect">
+            <a:avLst/>
+          </a:prstGeom>
+        </p:spPr>
+      </p:pic>
+    </p:spTree>
+    <p:extLst>
+      <p:ext uri="{BB962C8B-B14F-4D97-AF65-F5344CB8AC3E}">
+        <p14:creationId xmlns:p14="http://schemas.microsoft.com/office/powerpoint/2010/main" val="451443823"/>
+      </p:ext>
+    </p:extLst>
+  </p:cSld>
+  <p:clrMapOvr>
+    <a:masterClrMapping/>
+  </p:clrMapOvr>
+</p:sld>
+</file>
+
+<file path=ppt/slides/slide5.xml><?xml version="1.0" encoding="utf-8"?>
+<p:sld xmlns:a="http://schemas.openxmlformats.org/drawingml/2006/main" xmlns:r="http://schemas.openxmlformats.org/officeDocument/2006/relationships" xmlns:p="http://schemas.openxmlformats.org/presentationml/2006/main">
+  <p:cSld>
+    <p:spTree>
+      <p:nvGrpSpPr>
+        <p:cNvPr id="1" name=""/>
+        <p:cNvGrpSpPr/>
+        <p:nvPr/>
+      </p:nvGrpSpPr>
+      <p:grpSpPr>
+        <a:xfrm>
+          <a:off x="0" y="0"/>
+          <a:ext cx="0" cy="0"/>
+          <a:chOff x="0" y="0"/>
+          <a:chExt cx="0" cy="0"/>
+        </a:xfrm>
+      </p:grpSpPr>
+      <p:cxnSp>
+        <p:nvCxnSpPr>
+          <p:cNvPr id="5" name="Gerader Verbinder 4"/>
+          <p:cNvCxnSpPr/>
+          <p:nvPr/>
+        </p:nvCxnSpPr>
+        <p:spPr>
+          <a:xfrm flipH="1">
+            <a:off x="2567128" y="1247144"/>
+            <a:ext cx="0" cy="5519956"/>
+          </a:xfrm>
+          <a:prstGeom prst="line">
+            <a:avLst/>
+          </a:prstGeom>
+          <a:ln w="19050">
+            <a:solidFill>
+              <a:schemeClr val="bg1">
+                <a:lumMod val="65000"/>
+              </a:schemeClr>
+            </a:solidFill>
+            <a:prstDash val="lgDash"/>
+          </a:ln>
+        </p:spPr>
+        <p:style>
+          <a:lnRef idx="1">
+            <a:schemeClr val="accent1"/>
+          </a:lnRef>
+          <a:fillRef idx="0">
+            <a:schemeClr val="accent1"/>
+          </a:fillRef>
+          <a:effectRef idx="0">
+            <a:schemeClr val="accent1"/>
+          </a:effectRef>
+          <a:fontRef idx="minor">
+            <a:schemeClr val="tx1"/>
+          </a:fontRef>
+        </p:style>
+      </p:cxnSp>
+      <p:cxnSp>
+        <p:nvCxnSpPr>
+          <p:cNvPr id="6" name="Gerader Verbinder 5"/>
+          <p:cNvCxnSpPr/>
+          <p:nvPr/>
+        </p:nvCxnSpPr>
+        <p:spPr>
+          <a:xfrm flipH="1">
+            <a:off x="6154088" y="1247144"/>
+            <a:ext cx="0" cy="5519956"/>
+          </a:xfrm>
+          <a:prstGeom prst="line">
+            <a:avLst/>
+          </a:prstGeom>
+          <a:ln w="19050">
+            <a:solidFill>
+              <a:schemeClr val="bg1">
+                <a:lumMod val="75000"/>
+              </a:schemeClr>
+            </a:solidFill>
+            <a:prstDash val="lgDash"/>
+          </a:ln>
+        </p:spPr>
+        <p:style>
+          <a:lnRef idx="1">
+            <a:schemeClr val="accent1"/>
+          </a:lnRef>
+          <a:fillRef idx="0">
+            <a:schemeClr val="accent1"/>
+          </a:fillRef>
+          <a:effectRef idx="0">
+            <a:schemeClr val="accent1"/>
+          </a:effectRef>
+          <a:fontRef idx="minor">
+            <a:schemeClr val="tx1"/>
+          </a:fontRef>
+        </p:style>
+      </p:cxnSp>
+      <p:cxnSp>
+        <p:nvCxnSpPr>
+          <p:cNvPr id="8" name="Gerade Verbindung mit Pfeil 7"/>
+          <p:cNvCxnSpPr/>
+          <p:nvPr/>
+        </p:nvCxnSpPr>
+        <p:spPr>
+          <a:xfrm flipH="1">
+            <a:off x="2567129" y="1661814"/>
+            <a:ext cx="3586959" cy="0"/>
+          </a:xfrm>
+          <a:prstGeom prst="straightConnector1">
+            <a:avLst/>
+          </a:prstGeom>
+          <a:ln w="19050">
+            <a:solidFill>
+              <a:schemeClr val="tx1"/>
+            </a:solidFill>
+            <a:tailEnd type="triangle" w="lg" len="lg"/>
+          </a:ln>
+        </p:spPr>
+        <p:style>
+          <a:lnRef idx="1">
+            <a:schemeClr val="accent1"/>
+          </a:lnRef>
+          <a:fillRef idx="0">
+            <a:schemeClr val="accent1"/>
+          </a:fillRef>
+          <a:effectRef idx="0">
+            <a:schemeClr val="accent1"/>
+          </a:effectRef>
+          <a:fontRef idx="minor">
+            <a:schemeClr val="tx1"/>
+          </a:fontRef>
+        </p:style>
+      </p:cxnSp>
+      <p:sp>
+        <p:nvSpPr>
+          <p:cNvPr id="9" name="Textfeld 8"/>
+          <p:cNvSpPr txBox="1"/>
+          <p:nvPr/>
+        </p:nvSpPr>
+        <p:spPr>
+          <a:xfrm>
+            <a:off x="2971571" y="1292482"/>
+            <a:ext cx="3195560" cy="369332"/>
+          </a:xfrm>
+          <a:prstGeom prst="rect">
+            <a:avLst/>
+          </a:prstGeom>
+          <a:noFill/>
+        </p:spPr>
+        <p:txBody>
+          <a:bodyPr wrap="square" rtlCol="0">
+            <a:spAutoFit/>
+          </a:bodyPr>
+          <a:lstStyle/>
+          <a:p>
+            <a:r>
+              <a:rPr lang="de-DE" noProof="1" smtClean="0"/>
+              <a:t>Reference Signal, PSS, SSS</a:t>
+            </a:r>
+            <a:endParaRPr lang="de-DE" noProof="1"/>
+          </a:p>
+        </p:txBody>
+      </p:sp>
+      <p:cxnSp>
+        <p:nvCxnSpPr>
+          <p:cNvPr id="11" name="Gerade Verbindung mit Pfeil 10"/>
+          <p:cNvCxnSpPr/>
+          <p:nvPr/>
+        </p:nvCxnSpPr>
+        <p:spPr>
+          <a:xfrm flipH="1">
+            <a:off x="2582992" y="1988752"/>
+            <a:ext cx="3600000" cy="0"/>
+          </a:xfrm>
+          <a:prstGeom prst="straightConnector1">
+            <a:avLst/>
+          </a:prstGeom>
+          <a:ln w="19050">
+            <a:solidFill>
+              <a:schemeClr val="tx1"/>
+            </a:solidFill>
+            <a:tailEnd type="triangle" w="lg" len="lg"/>
+          </a:ln>
+        </p:spPr>
+        <p:style>
+          <a:lnRef idx="1">
+            <a:schemeClr val="accent1"/>
+          </a:lnRef>
+          <a:fillRef idx="0">
+            <a:schemeClr val="accent1"/>
+          </a:fillRef>
+          <a:effectRef idx="0">
+            <a:schemeClr val="accent1"/>
+          </a:effectRef>
+          <a:fontRef idx="minor">
+            <a:schemeClr val="tx1"/>
+          </a:fontRef>
+        </p:style>
+      </p:cxnSp>
+      <p:cxnSp>
+        <p:nvCxnSpPr>
+          <p:cNvPr id="12" name="Gerade Verbindung mit Pfeil 11"/>
+          <p:cNvCxnSpPr/>
+          <p:nvPr/>
+        </p:nvCxnSpPr>
+        <p:spPr>
+          <a:xfrm>
+            <a:off x="2582992" y="3770808"/>
+            <a:ext cx="3600000" cy="0"/>
+          </a:xfrm>
+          <a:prstGeom prst="straightConnector1">
+            <a:avLst/>
+          </a:prstGeom>
+          <a:ln w="19050">
+            <a:solidFill>
+              <a:srgbClr val="FF0000"/>
+            </a:solidFill>
+            <a:tailEnd type="triangle" w="lg" len="lg"/>
+          </a:ln>
+        </p:spPr>
+        <p:style>
+          <a:lnRef idx="1">
+            <a:schemeClr val="accent1"/>
+          </a:lnRef>
+          <a:fillRef idx="0">
+            <a:schemeClr val="accent1"/>
+          </a:fillRef>
+          <a:effectRef idx="0">
+            <a:schemeClr val="accent1"/>
+          </a:effectRef>
+          <a:fontRef idx="minor">
+            <a:schemeClr val="tx1"/>
+          </a:fontRef>
+        </p:style>
+      </p:cxnSp>
+      <p:sp>
+        <p:nvSpPr>
+          <p:cNvPr id="17" name="Textfeld 16"/>
+          <p:cNvSpPr txBox="1"/>
+          <p:nvPr/>
+        </p:nvSpPr>
+        <p:spPr>
+          <a:xfrm>
+            <a:off x="2971570" y="1639894"/>
+            <a:ext cx="3182517" cy="369332"/>
+          </a:xfrm>
+          <a:prstGeom prst="rect">
+            <a:avLst/>
+          </a:prstGeom>
+          <a:noFill/>
+        </p:spPr>
+        <p:txBody>
+          <a:bodyPr wrap="square" rtlCol="0">
+            <a:spAutoFit/>
+          </a:bodyPr>
+          <a:lstStyle/>
+          <a:p>
+            <a:r>
+              <a:rPr lang="de-DE" noProof="1" smtClean="0"/>
+              <a:t>MIB, SIB 1, SIB2, …</a:t>
+            </a:r>
+            <a:endParaRPr lang="de-DE" noProof="1"/>
+          </a:p>
+        </p:txBody>
+      </p:sp>
+      <p:sp>
+        <p:nvSpPr>
+          <p:cNvPr id="19" name="Textfeld 18"/>
+          <p:cNvSpPr txBox="1"/>
+          <p:nvPr/>
+        </p:nvSpPr>
+        <p:spPr>
+          <a:xfrm>
+            <a:off x="2891468" y="3396784"/>
+            <a:ext cx="3268274" cy="369332"/>
+          </a:xfrm>
+          <a:prstGeom prst="rect">
+            <a:avLst/>
+          </a:prstGeom>
+          <a:noFill/>
+        </p:spPr>
+        <p:txBody>
+          <a:bodyPr wrap="square" rtlCol="0">
+            <a:spAutoFit/>
+          </a:bodyPr>
+          <a:lstStyle/>
+          <a:p>
+            <a:r>
+              <a:rPr lang="de-DE" noProof="1" smtClean="0"/>
+              <a:t>PRACH Preamble</a:t>
+            </a:r>
+            <a:endParaRPr lang="de-DE" noProof="1"/>
+          </a:p>
+        </p:txBody>
+      </p:sp>
+      <p:cxnSp>
+        <p:nvCxnSpPr>
+          <p:cNvPr id="20" name="Gerade Verbindung mit Pfeil 19"/>
+          <p:cNvCxnSpPr/>
+          <p:nvPr/>
+        </p:nvCxnSpPr>
+        <p:spPr>
+          <a:xfrm flipH="1">
+            <a:off x="2567130" y="4144833"/>
+            <a:ext cx="3600000" cy="0"/>
+          </a:xfrm>
+          <a:prstGeom prst="straightConnector1">
+            <a:avLst/>
+          </a:prstGeom>
+          <a:ln w="19050">
+            <a:solidFill>
+              <a:srgbClr val="FF0000"/>
+            </a:solidFill>
+            <a:tailEnd type="triangle" w="lg" len="lg"/>
+          </a:ln>
+        </p:spPr>
+        <p:style>
+          <a:lnRef idx="1">
+            <a:schemeClr val="accent1"/>
+          </a:lnRef>
+          <a:fillRef idx="0">
+            <a:schemeClr val="accent1"/>
+          </a:fillRef>
+          <a:effectRef idx="0">
+            <a:schemeClr val="accent1"/>
+          </a:effectRef>
+          <a:fontRef idx="minor">
+            <a:schemeClr val="tx1"/>
+          </a:fontRef>
+        </p:style>
+      </p:cxnSp>
+      <p:sp>
+        <p:nvSpPr>
+          <p:cNvPr id="21" name="Textfeld 20"/>
+          <p:cNvSpPr txBox="1"/>
+          <p:nvPr/>
+        </p:nvSpPr>
+        <p:spPr>
+          <a:xfrm>
+            <a:off x="2885814" y="3770808"/>
+            <a:ext cx="3268274" cy="369332"/>
+          </a:xfrm>
+          <a:prstGeom prst="rect">
+            <a:avLst/>
+          </a:prstGeom>
+          <a:noFill/>
+        </p:spPr>
+        <p:txBody>
+          <a:bodyPr wrap="square" rtlCol="0">
+            <a:spAutoFit/>
+          </a:bodyPr>
+          <a:lstStyle/>
+          <a:p>
+            <a:r>
+              <a:rPr lang="de-DE" noProof="1" smtClean="0"/>
+              <a:t>PRACH Preamble Response</a:t>
+            </a:r>
+            <a:endParaRPr lang="de-DE" noProof="1"/>
+          </a:p>
+        </p:txBody>
+      </p:sp>
+      <p:cxnSp>
+        <p:nvCxnSpPr>
+          <p:cNvPr id="22" name="Gerade Verbindung mit Pfeil 21"/>
+          <p:cNvCxnSpPr/>
+          <p:nvPr/>
+        </p:nvCxnSpPr>
+        <p:spPr>
+          <a:xfrm flipH="1">
+            <a:off x="2567130" y="4903883"/>
+            <a:ext cx="3600000" cy="0"/>
+          </a:xfrm>
+          <a:prstGeom prst="straightConnector1">
+            <a:avLst/>
+          </a:prstGeom>
+          <a:ln w="19050">
+            <a:solidFill>
+              <a:schemeClr val="tx1"/>
+            </a:solidFill>
+            <a:tailEnd type="triangle" w="lg" len="lg"/>
+          </a:ln>
+        </p:spPr>
+        <p:style>
+          <a:lnRef idx="1">
+            <a:schemeClr val="accent1"/>
+          </a:lnRef>
+          <a:fillRef idx="0">
+            <a:schemeClr val="accent1"/>
+          </a:fillRef>
+          <a:effectRef idx="0">
+            <a:schemeClr val="accent1"/>
+          </a:effectRef>
+          <a:fontRef idx="minor">
+            <a:schemeClr val="tx1"/>
+          </a:fontRef>
+        </p:style>
+      </p:cxnSp>
+      <p:sp>
+        <p:nvSpPr>
+          <p:cNvPr id="23" name="Textfeld 22"/>
+          <p:cNvSpPr txBox="1"/>
+          <p:nvPr/>
+        </p:nvSpPr>
+        <p:spPr>
+          <a:xfrm>
+            <a:off x="2885813" y="4526636"/>
+            <a:ext cx="3281317" cy="369332"/>
+          </a:xfrm>
+          <a:prstGeom prst="rect">
+            <a:avLst/>
+          </a:prstGeom>
+          <a:noFill/>
+        </p:spPr>
+        <p:txBody>
+          <a:bodyPr wrap="square" rtlCol="0">
+            <a:spAutoFit/>
+          </a:bodyPr>
+          <a:lstStyle/>
+          <a:p>
+            <a:r>
+              <a:rPr lang="de-DE" noProof="1" smtClean="0"/>
+              <a:t>RRC Connection Setup</a:t>
+            </a:r>
+            <a:endParaRPr lang="de-DE" noProof="1"/>
+          </a:p>
+        </p:txBody>
+      </p:sp>
+      <p:cxnSp>
+        <p:nvCxnSpPr>
+          <p:cNvPr id="24" name="Gerade Verbindung mit Pfeil 23"/>
+          <p:cNvCxnSpPr/>
+          <p:nvPr/>
+        </p:nvCxnSpPr>
+        <p:spPr>
+          <a:xfrm>
+            <a:off x="2554087" y="4526636"/>
+            <a:ext cx="3600000" cy="0"/>
+          </a:xfrm>
+          <a:prstGeom prst="straightConnector1">
+            <a:avLst/>
+          </a:prstGeom>
+          <a:ln w="19050">
+            <a:solidFill>
+              <a:schemeClr val="tx1"/>
+            </a:solidFill>
+            <a:tailEnd type="triangle" w="lg" len="lg"/>
+          </a:ln>
+        </p:spPr>
+        <p:style>
+          <a:lnRef idx="1">
+            <a:schemeClr val="accent1"/>
+          </a:lnRef>
+          <a:fillRef idx="0">
+            <a:schemeClr val="accent1"/>
+          </a:fillRef>
+          <a:effectRef idx="0">
+            <a:schemeClr val="accent1"/>
+          </a:effectRef>
+          <a:fontRef idx="minor">
+            <a:schemeClr val="tx1"/>
+          </a:fontRef>
+        </p:style>
+      </p:cxnSp>
+      <p:sp>
+        <p:nvSpPr>
+          <p:cNvPr id="25" name="Textfeld 24"/>
+          <p:cNvSpPr txBox="1"/>
+          <p:nvPr/>
+        </p:nvSpPr>
+        <p:spPr>
+          <a:xfrm>
+            <a:off x="2890466" y="4144048"/>
+            <a:ext cx="3268275" cy="369332"/>
+          </a:xfrm>
+          <a:prstGeom prst="rect">
+            <a:avLst/>
+          </a:prstGeom>
+          <a:noFill/>
+        </p:spPr>
+        <p:txBody>
+          <a:bodyPr wrap="square" rtlCol="0">
+            <a:spAutoFit/>
+          </a:bodyPr>
+          <a:lstStyle/>
+          <a:p>
+            <a:r>
+              <a:rPr lang="de-DE" noProof="1" smtClean="0"/>
+              <a:t>RRC Connection Request</a:t>
+            </a:r>
+            <a:endParaRPr lang="de-DE" noProof="1"/>
+          </a:p>
+        </p:txBody>
+      </p:sp>
+      <p:cxnSp>
+        <p:nvCxnSpPr>
+          <p:cNvPr id="29" name="Gerade Verbindung mit Pfeil 28"/>
+          <p:cNvCxnSpPr/>
+          <p:nvPr/>
+        </p:nvCxnSpPr>
+        <p:spPr>
+          <a:xfrm>
+            <a:off x="2582992" y="5307095"/>
+            <a:ext cx="3600000" cy="0"/>
+          </a:xfrm>
+          <a:prstGeom prst="straightConnector1">
+            <a:avLst/>
+          </a:prstGeom>
+          <a:ln w="19050">
+            <a:solidFill>
+              <a:schemeClr val="tx1"/>
+            </a:solidFill>
+            <a:tailEnd type="triangle" w="lg" len="lg"/>
+          </a:ln>
+        </p:spPr>
+        <p:style>
+          <a:lnRef idx="1">
+            <a:schemeClr val="accent1"/>
+          </a:lnRef>
+          <a:fillRef idx="0">
+            <a:schemeClr val="accent1"/>
+          </a:fillRef>
+          <a:effectRef idx="0">
+            <a:schemeClr val="accent1"/>
+          </a:effectRef>
+          <a:fontRef idx="minor">
+            <a:schemeClr val="tx1"/>
+          </a:fontRef>
+        </p:style>
+      </p:cxnSp>
+      <p:sp>
+        <p:nvSpPr>
+          <p:cNvPr id="30" name="Textfeld 29"/>
+          <p:cNvSpPr txBox="1"/>
+          <p:nvPr/>
+        </p:nvSpPr>
+        <p:spPr>
+          <a:xfrm>
+            <a:off x="2892333" y="4936140"/>
+            <a:ext cx="3268275" cy="369332"/>
+          </a:xfrm>
+          <a:prstGeom prst="rect">
+            <a:avLst/>
+          </a:prstGeom>
+          <a:noFill/>
+        </p:spPr>
+        <p:txBody>
+          <a:bodyPr wrap="square" rtlCol="0">
+            <a:spAutoFit/>
+          </a:bodyPr>
+          <a:lstStyle/>
+          <a:p>
+            <a:r>
+              <a:rPr lang="de-DE" noProof="1" smtClean="0"/>
+              <a:t>RRC Connection Setup Complete</a:t>
+            </a:r>
+            <a:endParaRPr lang="de-DE" noProof="1"/>
+          </a:p>
+        </p:txBody>
+      </p:sp>
+      <p:sp>
+        <p:nvSpPr>
+          <p:cNvPr id="31" name="Rechteck 30"/>
+          <p:cNvSpPr/>
+          <p:nvPr/>
+        </p:nvSpPr>
+        <p:spPr>
+          <a:xfrm>
+            <a:off x="2390400" y="1558521"/>
+            <a:ext cx="45719" cy="532078"/>
+          </a:xfrm>
+          <a:prstGeom prst="rect">
+            <a:avLst/>
+          </a:prstGeom>
+          <a:ln>
+            <a:solidFill>
+              <a:schemeClr val="bg1"/>
+            </a:solidFill>
+          </a:ln>
+        </p:spPr>
+        <p:style>
+          <a:lnRef idx="2">
+            <a:schemeClr val="accent3">
+              <a:shade val="50000"/>
+            </a:schemeClr>
+          </a:lnRef>
+          <a:fillRef idx="1">
+            <a:schemeClr val="accent3"/>
+          </a:fillRef>
+          <a:effectRef idx="0">
+            <a:schemeClr val="accent3"/>
+          </a:effectRef>
+          <a:fontRef idx="minor">
+            <a:schemeClr val="lt1"/>
+          </a:fontRef>
+        </p:style>
+        <p:txBody>
+          <a:bodyPr rtlCol="0" anchor="ctr"/>
+          <a:lstStyle/>
+          <a:p>
+            <a:pPr algn="ctr"/>
+            <a:endParaRPr lang="de-DE"/>
+          </a:p>
+        </p:txBody>
+      </p:sp>
+      <p:sp>
+        <p:nvSpPr>
+          <p:cNvPr id="33" name="Textfeld 32"/>
+          <p:cNvSpPr txBox="1"/>
+          <p:nvPr/>
+        </p:nvSpPr>
+        <p:spPr>
+          <a:xfrm>
+            <a:off x="453762" y="1639894"/>
+            <a:ext cx="1948746" cy="369332"/>
+          </a:xfrm>
+          <a:prstGeom prst="rect">
+            <a:avLst/>
+          </a:prstGeom>
+          <a:noFill/>
+        </p:spPr>
+        <p:txBody>
+          <a:bodyPr wrap="square" rtlCol="0">
+            <a:spAutoFit/>
+          </a:bodyPr>
+          <a:lstStyle/>
+          <a:p>
+            <a:pPr algn="r"/>
+            <a:r>
+              <a:rPr lang="de-DE" noProof="1" smtClean="0"/>
+              <a:t>Cell Configuration</a:t>
+            </a:r>
+            <a:endParaRPr lang="de-DE" noProof="1"/>
+          </a:p>
+        </p:txBody>
+      </p:sp>
+      <p:sp>
+        <p:nvSpPr>
+          <p:cNvPr id="34" name="Rechteck 33"/>
+          <p:cNvSpPr/>
+          <p:nvPr/>
+        </p:nvSpPr>
+        <p:spPr>
+          <a:xfrm>
+            <a:off x="2388529" y="3670149"/>
+            <a:ext cx="46800" cy="540000"/>
+          </a:xfrm>
+          <a:prstGeom prst="rect">
+            <a:avLst/>
+          </a:prstGeom>
+          <a:solidFill>
+            <a:srgbClr val="00B050"/>
+          </a:solidFill>
+          <a:ln>
+            <a:solidFill>
+              <a:schemeClr val="bg1"/>
+            </a:solidFill>
+          </a:ln>
+        </p:spPr>
+        <p:style>
+          <a:lnRef idx="2">
+            <a:schemeClr val="accent3">
+              <a:shade val="50000"/>
+            </a:schemeClr>
+          </a:lnRef>
+          <a:fillRef idx="1">
+            <a:schemeClr val="accent3"/>
+          </a:fillRef>
+          <a:effectRef idx="0">
+            <a:schemeClr val="accent3"/>
+          </a:effectRef>
+          <a:fontRef idx="minor">
+            <a:schemeClr val="lt1"/>
+          </a:fontRef>
+        </p:style>
+        <p:txBody>
+          <a:bodyPr rtlCol="0" anchor="ctr"/>
+          <a:lstStyle/>
+          <a:p>
+            <a:pPr algn="ctr"/>
+            <a:endParaRPr lang="de-DE"/>
+          </a:p>
+        </p:txBody>
+      </p:sp>
+      <p:sp>
+        <p:nvSpPr>
+          <p:cNvPr id="35" name="Textfeld 34"/>
+          <p:cNvSpPr txBox="1"/>
+          <p:nvPr/>
+        </p:nvSpPr>
+        <p:spPr>
+          <a:xfrm>
+            <a:off x="453762" y="3755483"/>
+            <a:ext cx="1948746" cy="369332"/>
+          </a:xfrm>
+          <a:prstGeom prst="rect">
+            <a:avLst/>
+          </a:prstGeom>
+          <a:noFill/>
+        </p:spPr>
+        <p:txBody>
+          <a:bodyPr wrap="square" rtlCol="0">
+            <a:spAutoFit/>
+          </a:bodyPr>
+          <a:lstStyle/>
+          <a:p>
+            <a:pPr algn="r"/>
+            <a:r>
+              <a:rPr lang="de-DE" noProof="1" smtClean="0"/>
+              <a:t>Random Access</a:t>
+            </a:r>
+            <a:endParaRPr lang="de-DE" noProof="1"/>
+          </a:p>
+        </p:txBody>
+      </p:sp>
+      <p:sp>
+        <p:nvSpPr>
+          <p:cNvPr id="36" name="Textfeld 35"/>
+          <p:cNvSpPr txBox="1"/>
+          <p:nvPr/>
+        </p:nvSpPr>
+        <p:spPr>
+          <a:xfrm>
+            <a:off x="2097216" y="884067"/>
+            <a:ext cx="971551" cy="369332"/>
+          </a:xfrm>
+          <a:prstGeom prst="rect">
+            <a:avLst/>
+          </a:prstGeom>
+          <a:noFill/>
+        </p:spPr>
+        <p:txBody>
+          <a:bodyPr wrap="square" rtlCol="0">
+            <a:spAutoFit/>
+          </a:bodyPr>
+          <a:lstStyle/>
+          <a:p>
+            <a:pPr algn="ctr"/>
+            <a:r>
+              <a:rPr lang="de-DE" noProof="1" smtClean="0"/>
+              <a:t>UE</a:t>
+            </a:r>
+            <a:endParaRPr lang="de-DE" noProof="1"/>
+          </a:p>
+        </p:txBody>
+      </p:sp>
+      <p:sp>
+        <p:nvSpPr>
+          <p:cNvPr id="37" name="Textfeld 36"/>
+          <p:cNvSpPr txBox="1"/>
+          <p:nvPr/>
+        </p:nvSpPr>
+        <p:spPr>
+          <a:xfrm>
+            <a:off x="5668311" y="877812"/>
+            <a:ext cx="971551" cy="369332"/>
+          </a:xfrm>
+          <a:prstGeom prst="rect">
+            <a:avLst/>
+          </a:prstGeom>
+          <a:noFill/>
+        </p:spPr>
+        <p:txBody>
+          <a:bodyPr wrap="square" rtlCol="0">
+            <a:spAutoFit/>
+          </a:bodyPr>
+          <a:lstStyle/>
+          <a:p>
+            <a:pPr algn="ctr"/>
+            <a:r>
+              <a:rPr lang="de-DE" noProof="1" smtClean="0"/>
+              <a:t>eNodeB</a:t>
+            </a:r>
+            <a:endParaRPr lang="de-DE" noProof="1"/>
+          </a:p>
+        </p:txBody>
+      </p:sp>
+      <p:sp>
+        <p:nvSpPr>
+          <p:cNvPr id="38" name="Rechteck 37"/>
+          <p:cNvSpPr/>
+          <p:nvPr/>
+        </p:nvSpPr>
+        <p:spPr>
+          <a:xfrm>
+            <a:off x="2390400" y="4261302"/>
+            <a:ext cx="45719" cy="900000"/>
+          </a:xfrm>
+          <a:prstGeom prst="rect">
+            <a:avLst/>
+          </a:prstGeom>
+          <a:solidFill>
+            <a:srgbClr val="FF0000"/>
+          </a:solidFill>
+          <a:ln>
+            <a:solidFill>
+              <a:schemeClr val="bg1"/>
+            </a:solidFill>
+          </a:ln>
+        </p:spPr>
+        <p:style>
+          <a:lnRef idx="2">
+            <a:schemeClr val="accent3">
+              <a:shade val="50000"/>
+            </a:schemeClr>
+          </a:lnRef>
+          <a:fillRef idx="1">
+            <a:schemeClr val="accent3"/>
+          </a:fillRef>
+          <a:effectRef idx="0">
+            <a:schemeClr val="accent3"/>
+          </a:effectRef>
+          <a:fontRef idx="minor">
+            <a:schemeClr val="lt1"/>
+          </a:fontRef>
+        </p:style>
+        <p:txBody>
+          <a:bodyPr rtlCol="0" anchor="ctr"/>
+          <a:lstStyle/>
+          <a:p>
+            <a:pPr algn="ctr"/>
+            <a:endParaRPr lang="de-DE"/>
+          </a:p>
+        </p:txBody>
+      </p:sp>
+      <p:sp>
+        <p:nvSpPr>
+          <p:cNvPr id="39" name="Textfeld 38"/>
+          <p:cNvSpPr txBox="1"/>
+          <p:nvPr/>
+        </p:nvSpPr>
+        <p:spPr>
+          <a:xfrm>
+            <a:off x="453762" y="4526636"/>
+            <a:ext cx="1948746" cy="369332"/>
+          </a:xfrm>
+          <a:prstGeom prst="rect">
+            <a:avLst/>
+          </a:prstGeom>
+          <a:noFill/>
+        </p:spPr>
+        <p:txBody>
+          <a:bodyPr wrap="square" rtlCol="0">
+            <a:spAutoFit/>
+          </a:bodyPr>
+          <a:lstStyle/>
+          <a:p>
+            <a:pPr algn="r"/>
+            <a:r>
+              <a:rPr lang="de-DE" noProof="1" smtClean="0"/>
+              <a:t>RRC Setup</a:t>
+            </a:r>
+            <a:endParaRPr lang="de-DE" noProof="1"/>
+          </a:p>
+        </p:txBody>
+      </p:sp>
+      <p:pic>
+        <p:nvPicPr>
+          <p:cNvPr id="40" name="Grafik 39"/>
+          <p:cNvPicPr>
+            <a:picLocks noChangeAspect="1"/>
+          </p:cNvPicPr>
+          <p:nvPr/>
+        </p:nvPicPr>
+        <p:blipFill>
+          <a:blip r:embed="rId2"/>
+          <a:stretch>
+            <a:fillRect/>
+          </a:stretch>
+        </p:blipFill>
+        <p:spPr>
+          <a:xfrm>
+            <a:off x="2388530" y="65155"/>
+            <a:ext cx="524211" cy="720000"/>
+          </a:xfrm>
+          <a:prstGeom prst="rect">
+            <a:avLst/>
+          </a:prstGeom>
+        </p:spPr>
+      </p:pic>
+      <p:pic>
+        <p:nvPicPr>
+          <p:cNvPr id="41" name="Grafik 40"/>
+          <p:cNvPicPr>
+            <a:picLocks noChangeAspect="1"/>
+          </p:cNvPicPr>
+          <p:nvPr/>
+        </p:nvPicPr>
+        <p:blipFill>
+          <a:blip r:embed="rId3" cstate="print">
+            <a:extLst>
+              <a:ext uri="{28A0092B-C50C-407E-A947-70E740481C1C}">
+                <a14:useLocalDpi xmlns:a14="http://schemas.microsoft.com/office/drawing/2010/main" val="0"/>
+              </a:ext>
+            </a:extLst>
+          </a:blip>
+          <a:stretch>
+            <a:fillRect/>
+          </a:stretch>
+        </p:blipFill>
+        <p:spPr>
+          <a:xfrm>
+            <a:off x="5826642" y="190867"/>
+            <a:ext cx="720000" cy="720000"/>
+          </a:xfrm>
+          <a:prstGeom prst="rect">
+            <a:avLst/>
+          </a:prstGeom>
+        </p:spPr>
+      </p:pic>
+    </p:spTree>
+    <p:extLst>
+      <p:ext uri="{BB962C8B-B14F-4D97-AF65-F5344CB8AC3E}">
+        <p14:creationId xmlns:p14="http://schemas.microsoft.com/office/powerpoint/2010/main" val="2086634028"/>
+      </p:ext>
+    </p:extLst>
+  </p:cSld>
+  <p:clrMapOvr>
+    <a:masterClrMapping/>
+  </p:clrMapOvr>
+</p:sld>
+</file>
+
+<file path=ppt/slides/slide6.xml><?xml version="1.0" encoding="utf-8"?>
+<p:sld xmlns:a="http://schemas.openxmlformats.org/drawingml/2006/main" xmlns:r="http://schemas.openxmlformats.org/officeDocument/2006/relationships" xmlns:p="http://schemas.openxmlformats.org/presentationml/2006/main">
+  <p:cSld>
+    <p:spTree>
+      <p:nvGrpSpPr>
+        <p:cNvPr id="1" name=""/>
+        <p:cNvGrpSpPr/>
+        <p:nvPr/>
+      </p:nvGrpSpPr>
+      <p:grpSpPr>
+        <a:xfrm>
+          <a:off x="0" y="0"/>
+          <a:ext cx="0" cy="0"/>
+          <a:chOff x="0" y="0"/>
+          <a:chExt cx="0" cy="0"/>
+        </a:xfrm>
+      </p:grpSpPr>
+      <p:cxnSp>
+        <p:nvCxnSpPr>
+          <p:cNvPr id="5" name="Gerader Verbinder 4"/>
+          <p:cNvCxnSpPr/>
+          <p:nvPr/>
+        </p:nvCxnSpPr>
+        <p:spPr>
+          <a:xfrm flipH="1">
+            <a:off x="2567128" y="1247144"/>
+            <a:ext cx="0" cy="5519956"/>
+          </a:xfrm>
+          <a:prstGeom prst="line">
+            <a:avLst/>
+          </a:prstGeom>
+          <a:ln w="19050">
+            <a:solidFill>
+              <a:schemeClr val="bg1">
+                <a:lumMod val="65000"/>
+              </a:schemeClr>
+            </a:solidFill>
+            <a:prstDash val="lgDash"/>
+          </a:ln>
+        </p:spPr>
+        <p:style>
+          <a:lnRef idx="1">
+            <a:schemeClr val="accent1"/>
+          </a:lnRef>
+          <a:fillRef idx="0">
+            <a:schemeClr val="accent1"/>
+          </a:fillRef>
+          <a:effectRef idx="0">
+            <a:schemeClr val="accent1"/>
+          </a:effectRef>
+          <a:fontRef idx="minor">
+            <a:schemeClr val="tx1"/>
+          </a:fontRef>
+        </p:style>
+      </p:cxnSp>
+      <p:cxnSp>
+        <p:nvCxnSpPr>
+          <p:cNvPr id="6" name="Gerader Verbinder 5"/>
+          <p:cNvCxnSpPr/>
+          <p:nvPr/>
+        </p:nvCxnSpPr>
+        <p:spPr>
+          <a:xfrm flipH="1">
+            <a:off x="6154088" y="1247144"/>
+            <a:ext cx="0" cy="5519956"/>
+          </a:xfrm>
+          <a:prstGeom prst="line">
+            <a:avLst/>
+          </a:prstGeom>
+          <a:ln w="19050">
+            <a:solidFill>
+              <a:schemeClr val="bg1">
+                <a:lumMod val="75000"/>
+              </a:schemeClr>
+            </a:solidFill>
+            <a:prstDash val="lgDash"/>
+          </a:ln>
+        </p:spPr>
+        <p:style>
+          <a:lnRef idx="1">
+            <a:schemeClr val="accent1"/>
+          </a:lnRef>
+          <a:fillRef idx="0">
+            <a:schemeClr val="accent1"/>
+          </a:fillRef>
+          <a:effectRef idx="0">
+            <a:schemeClr val="accent1"/>
+          </a:effectRef>
+          <a:fontRef idx="minor">
+            <a:schemeClr val="tx1"/>
+          </a:fontRef>
+        </p:style>
+      </p:cxnSp>
+      <p:cxnSp>
+        <p:nvCxnSpPr>
+          <p:cNvPr id="8" name="Gerade Verbindung mit Pfeil 7"/>
+          <p:cNvCxnSpPr/>
+          <p:nvPr/>
+        </p:nvCxnSpPr>
+        <p:spPr>
+          <a:xfrm flipH="1">
+            <a:off x="2567129" y="1661814"/>
+            <a:ext cx="3586959" cy="0"/>
+          </a:xfrm>
+          <a:prstGeom prst="straightConnector1">
+            <a:avLst/>
+          </a:prstGeom>
+          <a:ln w="19050">
+            <a:solidFill>
+              <a:schemeClr val="tx1"/>
+            </a:solidFill>
+            <a:tailEnd type="triangle" w="lg" len="lg"/>
+          </a:ln>
+        </p:spPr>
+        <p:style>
+          <a:lnRef idx="1">
+            <a:schemeClr val="accent1"/>
+          </a:lnRef>
+          <a:fillRef idx="0">
+            <a:schemeClr val="accent1"/>
+          </a:fillRef>
+          <a:effectRef idx="0">
+            <a:schemeClr val="accent1"/>
+          </a:effectRef>
+          <a:fontRef idx="minor">
+            <a:schemeClr val="tx1"/>
+          </a:fontRef>
+        </p:style>
+      </p:cxnSp>
+      <p:sp>
+        <p:nvSpPr>
+          <p:cNvPr id="9" name="Textfeld 8"/>
+          <p:cNvSpPr txBox="1"/>
+          <p:nvPr/>
+        </p:nvSpPr>
+        <p:spPr>
+          <a:xfrm>
+            <a:off x="2971571" y="1292482"/>
+            <a:ext cx="3195560" cy="369332"/>
+          </a:xfrm>
+          <a:prstGeom prst="rect">
+            <a:avLst/>
+          </a:prstGeom>
+          <a:noFill/>
+        </p:spPr>
+        <p:txBody>
+          <a:bodyPr wrap="square" rtlCol="0">
+            <a:spAutoFit/>
+          </a:bodyPr>
+          <a:lstStyle/>
+          <a:p>
+            <a:r>
+              <a:rPr lang="de-DE" noProof="1" smtClean="0"/>
+              <a:t>Reference Signal, PSS, SSS</a:t>
+            </a:r>
+            <a:endParaRPr lang="de-DE" noProof="1"/>
+          </a:p>
+        </p:txBody>
+      </p:sp>
+      <p:cxnSp>
+        <p:nvCxnSpPr>
+          <p:cNvPr id="11" name="Gerade Verbindung mit Pfeil 10"/>
+          <p:cNvCxnSpPr/>
+          <p:nvPr/>
+        </p:nvCxnSpPr>
+        <p:spPr>
+          <a:xfrm flipH="1">
+            <a:off x="2582992" y="1988752"/>
+            <a:ext cx="3600000" cy="0"/>
+          </a:xfrm>
+          <a:prstGeom prst="straightConnector1">
+            <a:avLst/>
+          </a:prstGeom>
+          <a:ln w="19050">
+            <a:solidFill>
+              <a:schemeClr val="tx1"/>
+            </a:solidFill>
+            <a:tailEnd type="triangle" w="lg" len="lg"/>
+          </a:ln>
+        </p:spPr>
+        <p:style>
+          <a:lnRef idx="1">
+            <a:schemeClr val="accent1"/>
+          </a:lnRef>
+          <a:fillRef idx="0">
+            <a:schemeClr val="accent1"/>
+          </a:fillRef>
+          <a:effectRef idx="0">
+            <a:schemeClr val="accent1"/>
+          </a:effectRef>
+          <a:fontRef idx="minor">
+            <a:schemeClr val="tx1"/>
+          </a:fontRef>
+        </p:style>
+      </p:cxnSp>
+      <p:cxnSp>
+        <p:nvCxnSpPr>
+          <p:cNvPr id="12" name="Gerade Verbindung mit Pfeil 11"/>
+          <p:cNvCxnSpPr/>
+          <p:nvPr/>
+        </p:nvCxnSpPr>
+        <p:spPr>
+          <a:xfrm>
+            <a:off x="2582992" y="3770808"/>
+            <a:ext cx="3600000" cy="0"/>
+          </a:xfrm>
+          <a:prstGeom prst="straightConnector1">
+            <a:avLst/>
+          </a:prstGeom>
+          <a:ln w="19050">
+            <a:solidFill>
+              <a:schemeClr val="tx1"/>
+            </a:solidFill>
+            <a:tailEnd type="triangle" w="lg" len="lg"/>
+          </a:ln>
+        </p:spPr>
+        <p:style>
+          <a:lnRef idx="1">
+            <a:schemeClr val="accent1"/>
+          </a:lnRef>
+          <a:fillRef idx="0">
+            <a:schemeClr val="accent1"/>
+          </a:fillRef>
+          <a:effectRef idx="0">
+            <a:schemeClr val="accent1"/>
+          </a:effectRef>
+          <a:fontRef idx="minor">
+            <a:schemeClr val="tx1"/>
+          </a:fontRef>
+        </p:style>
+      </p:cxnSp>
+      <p:sp>
+        <p:nvSpPr>
+          <p:cNvPr id="17" name="Textfeld 16"/>
+          <p:cNvSpPr txBox="1"/>
+          <p:nvPr/>
+        </p:nvSpPr>
+        <p:spPr>
+          <a:xfrm>
+            <a:off x="2971570" y="1639894"/>
+            <a:ext cx="3182517" cy="369332"/>
+          </a:xfrm>
+          <a:prstGeom prst="rect">
+            <a:avLst/>
+          </a:prstGeom>
+          <a:noFill/>
+        </p:spPr>
+        <p:txBody>
+          <a:bodyPr wrap="square" rtlCol="0">
+            <a:spAutoFit/>
+          </a:bodyPr>
+          <a:lstStyle/>
+          <a:p>
+            <a:r>
+              <a:rPr lang="de-DE" noProof="1" smtClean="0"/>
+              <a:t>MIB, SIB 1, SIB2, …</a:t>
+            </a:r>
+            <a:endParaRPr lang="de-DE" noProof="1"/>
+          </a:p>
+        </p:txBody>
+      </p:sp>
+      <p:sp>
+        <p:nvSpPr>
+          <p:cNvPr id="19" name="Textfeld 18"/>
+          <p:cNvSpPr txBox="1"/>
+          <p:nvPr/>
+        </p:nvSpPr>
+        <p:spPr>
+          <a:xfrm>
+            <a:off x="2891468" y="3396784"/>
+            <a:ext cx="3268274" cy="369332"/>
+          </a:xfrm>
+          <a:prstGeom prst="rect">
+            <a:avLst/>
+          </a:prstGeom>
+          <a:noFill/>
+        </p:spPr>
+        <p:txBody>
+          <a:bodyPr wrap="square" rtlCol="0">
+            <a:spAutoFit/>
+          </a:bodyPr>
+          <a:lstStyle/>
+          <a:p>
+            <a:r>
+              <a:rPr lang="de-DE" noProof="1" smtClean="0"/>
+              <a:t>PRACH Preamble</a:t>
+            </a:r>
+            <a:endParaRPr lang="de-DE" noProof="1"/>
+          </a:p>
+        </p:txBody>
+      </p:sp>
+      <p:cxnSp>
+        <p:nvCxnSpPr>
+          <p:cNvPr id="20" name="Gerade Verbindung mit Pfeil 19"/>
+          <p:cNvCxnSpPr/>
+          <p:nvPr/>
+        </p:nvCxnSpPr>
+        <p:spPr>
+          <a:xfrm flipH="1">
+            <a:off x="2567130" y="4144833"/>
+            <a:ext cx="3600000" cy="0"/>
+          </a:xfrm>
+          <a:prstGeom prst="straightConnector1">
+            <a:avLst/>
+          </a:prstGeom>
+          <a:ln w="19050">
+            <a:solidFill>
+              <a:schemeClr val="tx1"/>
+            </a:solidFill>
+            <a:tailEnd type="triangle" w="lg" len="lg"/>
+          </a:ln>
+        </p:spPr>
+        <p:style>
+          <a:lnRef idx="1">
+            <a:schemeClr val="accent1"/>
+          </a:lnRef>
+          <a:fillRef idx="0">
+            <a:schemeClr val="accent1"/>
+          </a:fillRef>
+          <a:effectRef idx="0">
+            <a:schemeClr val="accent1"/>
+          </a:effectRef>
+          <a:fontRef idx="minor">
+            <a:schemeClr val="tx1"/>
+          </a:fontRef>
+        </p:style>
+      </p:cxnSp>
+      <p:sp>
+        <p:nvSpPr>
+          <p:cNvPr id="21" name="Textfeld 20"/>
+          <p:cNvSpPr txBox="1"/>
+          <p:nvPr/>
+        </p:nvSpPr>
+        <p:spPr>
+          <a:xfrm>
+            <a:off x="2885814" y="3770808"/>
+            <a:ext cx="3268274" cy="369332"/>
+          </a:xfrm>
+          <a:prstGeom prst="rect">
+            <a:avLst/>
+          </a:prstGeom>
+          <a:noFill/>
+        </p:spPr>
+        <p:txBody>
+          <a:bodyPr wrap="square" rtlCol="0">
+            <a:spAutoFit/>
+          </a:bodyPr>
+          <a:lstStyle/>
+          <a:p>
+            <a:r>
+              <a:rPr lang="de-DE" noProof="1" smtClean="0"/>
+              <a:t>PRACH Preamble Response</a:t>
+            </a:r>
+            <a:endParaRPr lang="de-DE" noProof="1"/>
+          </a:p>
+        </p:txBody>
+      </p:sp>
+      <p:cxnSp>
+        <p:nvCxnSpPr>
+          <p:cNvPr id="22" name="Gerade Verbindung mit Pfeil 21"/>
+          <p:cNvCxnSpPr/>
+          <p:nvPr/>
+        </p:nvCxnSpPr>
+        <p:spPr>
+          <a:xfrm flipH="1">
+            <a:off x="2567130" y="4903883"/>
+            <a:ext cx="3600000" cy="0"/>
+          </a:xfrm>
+          <a:prstGeom prst="straightConnector1">
+            <a:avLst/>
+          </a:prstGeom>
+          <a:ln w="19050">
+            <a:solidFill>
+              <a:srgbClr val="FF0000"/>
+            </a:solidFill>
+            <a:tailEnd type="triangle" w="lg" len="lg"/>
+          </a:ln>
+        </p:spPr>
+        <p:style>
+          <a:lnRef idx="1">
+            <a:schemeClr val="accent1"/>
+          </a:lnRef>
+          <a:fillRef idx="0">
+            <a:schemeClr val="accent1"/>
+          </a:fillRef>
+          <a:effectRef idx="0">
+            <a:schemeClr val="accent1"/>
+          </a:effectRef>
+          <a:fontRef idx="minor">
+            <a:schemeClr val="tx1"/>
+          </a:fontRef>
+        </p:style>
+      </p:cxnSp>
+      <p:sp>
+        <p:nvSpPr>
+          <p:cNvPr id="23" name="Textfeld 22"/>
+          <p:cNvSpPr txBox="1"/>
+          <p:nvPr/>
+        </p:nvSpPr>
+        <p:spPr>
+          <a:xfrm>
+            <a:off x="2885813" y="4526636"/>
+            <a:ext cx="3281317" cy="369332"/>
+          </a:xfrm>
+          <a:prstGeom prst="rect">
+            <a:avLst/>
+          </a:prstGeom>
+          <a:noFill/>
+        </p:spPr>
+        <p:txBody>
+          <a:bodyPr wrap="square" rtlCol="0">
+            <a:spAutoFit/>
+          </a:bodyPr>
+          <a:lstStyle/>
+          <a:p>
+            <a:r>
+              <a:rPr lang="de-DE" noProof="1" smtClean="0"/>
+              <a:t>RRC Connection Setup</a:t>
+            </a:r>
+            <a:endParaRPr lang="de-DE" noProof="1"/>
+          </a:p>
+        </p:txBody>
+      </p:sp>
+      <p:cxnSp>
+        <p:nvCxnSpPr>
+          <p:cNvPr id="24" name="Gerade Verbindung mit Pfeil 23"/>
+          <p:cNvCxnSpPr/>
+          <p:nvPr/>
+        </p:nvCxnSpPr>
+        <p:spPr>
+          <a:xfrm>
+            <a:off x="2554087" y="4526636"/>
+            <a:ext cx="3600000" cy="0"/>
+          </a:xfrm>
+          <a:prstGeom prst="straightConnector1">
+            <a:avLst/>
+          </a:prstGeom>
+          <a:ln w="19050">
+            <a:solidFill>
+              <a:srgbClr val="FF0000"/>
+            </a:solidFill>
+            <a:tailEnd type="triangle" w="lg" len="lg"/>
+          </a:ln>
+        </p:spPr>
+        <p:style>
+          <a:lnRef idx="1">
+            <a:schemeClr val="accent1"/>
+          </a:lnRef>
+          <a:fillRef idx="0">
+            <a:schemeClr val="accent1"/>
+          </a:fillRef>
+          <a:effectRef idx="0">
+            <a:schemeClr val="accent1"/>
+          </a:effectRef>
+          <a:fontRef idx="minor">
+            <a:schemeClr val="tx1"/>
+          </a:fontRef>
+        </p:style>
+      </p:cxnSp>
+      <p:sp>
+        <p:nvSpPr>
+          <p:cNvPr id="25" name="Textfeld 24"/>
+          <p:cNvSpPr txBox="1"/>
+          <p:nvPr/>
+        </p:nvSpPr>
+        <p:spPr>
+          <a:xfrm>
+            <a:off x="2890466" y="4144048"/>
+            <a:ext cx="3268275" cy="369332"/>
+          </a:xfrm>
+          <a:prstGeom prst="rect">
+            <a:avLst/>
+          </a:prstGeom>
+          <a:noFill/>
+        </p:spPr>
+        <p:txBody>
+          <a:bodyPr wrap="square" rtlCol="0">
+            <a:spAutoFit/>
+          </a:bodyPr>
+          <a:lstStyle/>
+          <a:p>
+            <a:r>
+              <a:rPr lang="de-DE" noProof="1" smtClean="0"/>
+              <a:t>RRC Connection Request</a:t>
+            </a:r>
+            <a:endParaRPr lang="de-DE" noProof="1"/>
+          </a:p>
+        </p:txBody>
+      </p:sp>
+      <p:cxnSp>
+        <p:nvCxnSpPr>
+          <p:cNvPr id="29" name="Gerade Verbindung mit Pfeil 28"/>
+          <p:cNvCxnSpPr/>
+          <p:nvPr/>
+        </p:nvCxnSpPr>
+        <p:spPr>
+          <a:xfrm>
+            <a:off x="2582992" y="5307095"/>
+            <a:ext cx="3600000" cy="0"/>
+          </a:xfrm>
+          <a:prstGeom prst="straightConnector1">
+            <a:avLst/>
+          </a:prstGeom>
+          <a:ln w="19050">
+            <a:solidFill>
+              <a:srgbClr val="FF0000"/>
+            </a:solidFill>
+            <a:tailEnd type="triangle" w="lg" len="lg"/>
+          </a:ln>
+        </p:spPr>
+        <p:style>
+          <a:lnRef idx="1">
+            <a:schemeClr val="accent1"/>
+          </a:lnRef>
+          <a:fillRef idx="0">
+            <a:schemeClr val="accent1"/>
+          </a:fillRef>
+          <a:effectRef idx="0">
+            <a:schemeClr val="accent1"/>
+          </a:effectRef>
+          <a:fontRef idx="minor">
+            <a:schemeClr val="tx1"/>
+          </a:fontRef>
+        </p:style>
+      </p:cxnSp>
+      <p:sp>
+        <p:nvSpPr>
+          <p:cNvPr id="30" name="Textfeld 29"/>
+          <p:cNvSpPr txBox="1"/>
+          <p:nvPr/>
+        </p:nvSpPr>
+        <p:spPr>
+          <a:xfrm>
+            <a:off x="2892333" y="4936140"/>
+            <a:ext cx="3268275" cy="369332"/>
+          </a:xfrm>
+          <a:prstGeom prst="rect">
+            <a:avLst/>
+          </a:prstGeom>
+          <a:noFill/>
+        </p:spPr>
+        <p:txBody>
+          <a:bodyPr wrap="square" rtlCol="0">
+            <a:spAutoFit/>
+          </a:bodyPr>
+          <a:lstStyle/>
+          <a:p>
+            <a:r>
+              <a:rPr lang="de-DE" noProof="1" smtClean="0"/>
+              <a:t>RRC Connection Setup Complete</a:t>
+            </a:r>
+            <a:endParaRPr lang="de-DE" noProof="1"/>
+          </a:p>
+        </p:txBody>
+      </p:sp>
+      <p:sp>
+        <p:nvSpPr>
+          <p:cNvPr id="31" name="Rechteck 30"/>
+          <p:cNvSpPr/>
+          <p:nvPr/>
+        </p:nvSpPr>
+        <p:spPr>
+          <a:xfrm>
+            <a:off x="2390400" y="1558521"/>
+            <a:ext cx="45719" cy="532078"/>
+          </a:xfrm>
+          <a:prstGeom prst="rect">
+            <a:avLst/>
+          </a:prstGeom>
+          <a:ln>
+            <a:solidFill>
+              <a:schemeClr val="bg1"/>
+            </a:solidFill>
+          </a:ln>
+        </p:spPr>
+        <p:style>
+          <a:lnRef idx="2">
+            <a:schemeClr val="accent3">
+              <a:shade val="50000"/>
+            </a:schemeClr>
+          </a:lnRef>
+          <a:fillRef idx="1">
+            <a:schemeClr val="accent3"/>
+          </a:fillRef>
+          <a:effectRef idx="0">
+            <a:schemeClr val="accent3"/>
+          </a:effectRef>
+          <a:fontRef idx="minor">
+            <a:schemeClr val="lt1"/>
+          </a:fontRef>
+        </p:style>
+        <p:txBody>
+          <a:bodyPr rtlCol="0" anchor="ctr"/>
+          <a:lstStyle/>
+          <a:p>
+            <a:pPr algn="ctr"/>
+            <a:endParaRPr lang="de-DE"/>
+          </a:p>
+        </p:txBody>
+      </p:sp>
+      <p:sp>
+        <p:nvSpPr>
+          <p:cNvPr id="33" name="Textfeld 32"/>
+          <p:cNvSpPr txBox="1"/>
+          <p:nvPr/>
+        </p:nvSpPr>
+        <p:spPr>
+          <a:xfrm>
+            <a:off x="453762" y="1639894"/>
+            <a:ext cx="1948746" cy="369332"/>
+          </a:xfrm>
+          <a:prstGeom prst="rect">
+            <a:avLst/>
+          </a:prstGeom>
+          <a:noFill/>
+        </p:spPr>
+        <p:txBody>
+          <a:bodyPr wrap="square" rtlCol="0">
+            <a:spAutoFit/>
+          </a:bodyPr>
+          <a:lstStyle/>
+          <a:p>
+            <a:pPr algn="r"/>
+            <a:r>
+              <a:rPr lang="de-DE" noProof="1" smtClean="0"/>
+              <a:t>Cell Configuration</a:t>
+            </a:r>
+            <a:endParaRPr lang="de-DE" noProof="1"/>
+          </a:p>
+        </p:txBody>
+      </p:sp>
+      <p:sp>
+        <p:nvSpPr>
+          <p:cNvPr id="34" name="Rechteck 33"/>
+          <p:cNvSpPr/>
+          <p:nvPr/>
+        </p:nvSpPr>
+        <p:spPr>
+          <a:xfrm>
+            <a:off x="2388529" y="3670149"/>
+            <a:ext cx="46800" cy="540000"/>
+          </a:xfrm>
+          <a:prstGeom prst="rect">
+            <a:avLst/>
+          </a:prstGeom>
+          <a:solidFill>
+            <a:srgbClr val="00B050"/>
+          </a:solidFill>
+          <a:ln>
+            <a:solidFill>
+              <a:schemeClr val="bg1"/>
+            </a:solidFill>
+          </a:ln>
+        </p:spPr>
+        <p:style>
+          <a:lnRef idx="2">
+            <a:schemeClr val="accent3">
+              <a:shade val="50000"/>
+            </a:schemeClr>
+          </a:lnRef>
+          <a:fillRef idx="1">
+            <a:schemeClr val="accent3"/>
+          </a:fillRef>
+          <a:effectRef idx="0">
+            <a:schemeClr val="accent3"/>
+          </a:effectRef>
+          <a:fontRef idx="minor">
+            <a:schemeClr val="lt1"/>
+          </a:fontRef>
+        </p:style>
+        <p:txBody>
+          <a:bodyPr rtlCol="0" anchor="ctr"/>
+          <a:lstStyle/>
+          <a:p>
+            <a:pPr algn="ctr"/>
+            <a:endParaRPr lang="de-DE"/>
+          </a:p>
+        </p:txBody>
+      </p:sp>
+      <p:sp>
+        <p:nvSpPr>
+          <p:cNvPr id="35" name="Textfeld 34"/>
+          <p:cNvSpPr txBox="1"/>
+          <p:nvPr/>
+        </p:nvSpPr>
+        <p:spPr>
+          <a:xfrm>
+            <a:off x="453762" y="3755483"/>
+            <a:ext cx="1948746" cy="369332"/>
+          </a:xfrm>
+          <a:prstGeom prst="rect">
+            <a:avLst/>
+          </a:prstGeom>
+          <a:noFill/>
+        </p:spPr>
+        <p:txBody>
+          <a:bodyPr wrap="square" rtlCol="0">
+            <a:spAutoFit/>
+          </a:bodyPr>
+          <a:lstStyle/>
+          <a:p>
+            <a:pPr algn="r"/>
+            <a:r>
+              <a:rPr lang="de-DE" noProof="1" smtClean="0"/>
+              <a:t>Random Access</a:t>
+            </a:r>
+            <a:endParaRPr lang="de-DE" noProof="1"/>
+          </a:p>
+        </p:txBody>
+      </p:sp>
+      <p:sp>
+        <p:nvSpPr>
+          <p:cNvPr id="36" name="Textfeld 35"/>
+          <p:cNvSpPr txBox="1"/>
+          <p:nvPr/>
+        </p:nvSpPr>
+        <p:spPr>
+          <a:xfrm>
+            <a:off x="2097216" y="884067"/>
+            <a:ext cx="971551" cy="369332"/>
+          </a:xfrm>
+          <a:prstGeom prst="rect">
+            <a:avLst/>
+          </a:prstGeom>
+          <a:noFill/>
+        </p:spPr>
+        <p:txBody>
+          <a:bodyPr wrap="square" rtlCol="0">
+            <a:spAutoFit/>
+          </a:bodyPr>
+          <a:lstStyle/>
+          <a:p>
+            <a:pPr algn="ctr"/>
+            <a:r>
+              <a:rPr lang="de-DE" noProof="1" smtClean="0"/>
+              <a:t>UE</a:t>
+            </a:r>
+            <a:endParaRPr lang="de-DE" noProof="1"/>
+          </a:p>
+        </p:txBody>
+      </p:sp>
+      <p:sp>
+        <p:nvSpPr>
+          <p:cNvPr id="37" name="Textfeld 36"/>
+          <p:cNvSpPr txBox="1"/>
+          <p:nvPr/>
+        </p:nvSpPr>
+        <p:spPr>
+          <a:xfrm>
+            <a:off x="5668311" y="877812"/>
+            <a:ext cx="971551" cy="369332"/>
+          </a:xfrm>
+          <a:prstGeom prst="rect">
+            <a:avLst/>
+          </a:prstGeom>
+          <a:noFill/>
+        </p:spPr>
+        <p:txBody>
+          <a:bodyPr wrap="square" rtlCol="0">
+            <a:spAutoFit/>
+          </a:bodyPr>
+          <a:lstStyle/>
+          <a:p>
+            <a:pPr algn="ctr"/>
+            <a:r>
+              <a:rPr lang="de-DE" noProof="1" smtClean="0"/>
+              <a:t>eNodeB</a:t>
+            </a:r>
+            <a:endParaRPr lang="de-DE" noProof="1"/>
+          </a:p>
+        </p:txBody>
+      </p:sp>
+      <p:sp>
+        <p:nvSpPr>
+          <p:cNvPr id="38" name="Rechteck 37"/>
+          <p:cNvSpPr/>
+          <p:nvPr/>
+        </p:nvSpPr>
+        <p:spPr>
+          <a:xfrm>
+            <a:off x="2390400" y="4261302"/>
+            <a:ext cx="45719" cy="900000"/>
+          </a:xfrm>
+          <a:prstGeom prst="rect">
+            <a:avLst/>
+          </a:prstGeom>
+          <a:solidFill>
+            <a:srgbClr val="FF0000"/>
+          </a:solidFill>
+          <a:ln>
+            <a:solidFill>
+              <a:schemeClr val="bg1"/>
+            </a:solidFill>
+          </a:ln>
+        </p:spPr>
+        <p:style>
+          <a:lnRef idx="2">
+            <a:schemeClr val="accent3">
+              <a:shade val="50000"/>
+            </a:schemeClr>
+          </a:lnRef>
+          <a:fillRef idx="1">
+            <a:schemeClr val="accent3"/>
+          </a:fillRef>
+          <a:effectRef idx="0">
+            <a:schemeClr val="accent3"/>
+          </a:effectRef>
+          <a:fontRef idx="minor">
+            <a:schemeClr val="lt1"/>
+          </a:fontRef>
+        </p:style>
+        <p:txBody>
+          <a:bodyPr rtlCol="0" anchor="ctr"/>
+          <a:lstStyle/>
+          <a:p>
+            <a:pPr algn="ctr"/>
+            <a:endParaRPr lang="de-DE"/>
+          </a:p>
+        </p:txBody>
+      </p:sp>
+      <p:sp>
+        <p:nvSpPr>
+          <p:cNvPr id="39" name="Textfeld 38"/>
+          <p:cNvSpPr txBox="1"/>
+          <p:nvPr/>
+        </p:nvSpPr>
+        <p:spPr>
+          <a:xfrm>
+            <a:off x="453762" y="4526636"/>
+            <a:ext cx="1948746" cy="369332"/>
+          </a:xfrm>
+          <a:prstGeom prst="rect">
+            <a:avLst/>
+          </a:prstGeom>
+          <a:noFill/>
+        </p:spPr>
+        <p:txBody>
+          <a:bodyPr wrap="square" rtlCol="0">
+            <a:spAutoFit/>
+          </a:bodyPr>
+          <a:lstStyle/>
+          <a:p>
+            <a:pPr algn="r"/>
+            <a:r>
+              <a:rPr lang="de-DE" noProof="1" smtClean="0"/>
+              <a:t>RRC Setup</a:t>
+            </a:r>
+            <a:endParaRPr lang="de-DE" noProof="1"/>
+          </a:p>
+        </p:txBody>
+      </p:sp>
+      <p:pic>
+        <p:nvPicPr>
+          <p:cNvPr id="40" name="Grafik 39"/>
+          <p:cNvPicPr>
+            <a:picLocks noChangeAspect="1"/>
+          </p:cNvPicPr>
+          <p:nvPr/>
+        </p:nvPicPr>
+        <p:blipFill>
+          <a:blip r:embed="rId2"/>
+          <a:stretch>
+            <a:fillRect/>
+          </a:stretch>
+        </p:blipFill>
+        <p:spPr>
+          <a:xfrm>
+            <a:off x="2388530" y="65155"/>
+            <a:ext cx="524211" cy="720000"/>
+          </a:xfrm>
+          <a:prstGeom prst="rect">
+            <a:avLst/>
+          </a:prstGeom>
+        </p:spPr>
+      </p:pic>
+      <p:pic>
+        <p:nvPicPr>
+          <p:cNvPr id="41" name="Grafik 40"/>
+          <p:cNvPicPr>
+            <a:picLocks noChangeAspect="1"/>
+          </p:cNvPicPr>
+          <p:nvPr/>
+        </p:nvPicPr>
+        <p:blipFill>
+          <a:blip r:embed="rId3" cstate="print">
+            <a:extLst>
+              <a:ext uri="{28A0092B-C50C-407E-A947-70E740481C1C}">
+                <a14:useLocalDpi xmlns:a14="http://schemas.microsoft.com/office/drawing/2010/main" val="0"/>
+              </a:ext>
+            </a:extLst>
+          </a:blip>
+          <a:stretch>
+            <a:fillRect/>
+          </a:stretch>
+        </p:blipFill>
+        <p:spPr>
+          <a:xfrm>
+            <a:off x="5826642" y="190867"/>
+            <a:ext cx="720000" cy="720000"/>
+          </a:xfrm>
+          <a:prstGeom prst="rect">
+            <a:avLst/>
+          </a:prstGeom>
+        </p:spPr>
+      </p:pic>
+    </p:spTree>
+    <p:extLst>
+      <p:ext uri="{BB962C8B-B14F-4D97-AF65-F5344CB8AC3E}">
+        <p14:creationId xmlns:p14="http://schemas.microsoft.com/office/powerpoint/2010/main" val="1982182596"/>
+      </p:ext>
+    </p:extLst>
+  </p:cSld>
+  <p:clrMapOvr>
+    <a:masterClrMapping/>
+  </p:clrMapOvr>
+</p:sld>
+</file>
+
+<file path=ppt/slides/slide7.xml><?xml version="1.0" encoding="utf-8"?>
+<p:sld xmlns:a="http://schemas.openxmlformats.org/drawingml/2006/main" xmlns:r="http://schemas.openxmlformats.org/officeDocument/2006/relationships" xmlns:p="http://schemas.openxmlformats.org/presentationml/2006/main">
+  <p:cSld>
+    <p:spTree>
+      <p:nvGrpSpPr>
+        <p:cNvPr id="1" name=""/>
+        <p:cNvGrpSpPr/>
+        <p:nvPr/>
+      </p:nvGrpSpPr>
+      <p:grpSpPr>
+        <a:xfrm>
+          <a:off x="0" y="0"/>
+          <a:ext cx="0" cy="0"/>
+          <a:chOff x="0" y="0"/>
+          <a:chExt cx="0" cy="0"/>
+        </a:xfrm>
+      </p:grpSpPr>
+      <p:sp>
+        <p:nvSpPr>
+          <p:cNvPr id="31" name="Pfeil nach rechts 30"/>
+          <p:cNvSpPr/>
+          <p:nvPr/>
+        </p:nvSpPr>
+        <p:spPr>
+          <a:xfrm rot="5400000">
+            <a:off x="5865343" y="2548462"/>
+            <a:ext cx="694039" cy="2332576"/>
+          </a:xfrm>
+          <a:prstGeom prst="rightArrow">
+            <a:avLst/>
           </a:prstGeom>
           <a:solidFill>
             <a:schemeClr val="accent1">
@@ -4755,26 +8325,22 @@
           <a:lstStyle/>
           <a:p>
             <a:pPr algn="ctr"/>
-            <a:endParaRPr lang="de-DE">
-              <a:solidFill>
-                <a:schemeClr val="tx1"/>
-              </a:solidFill>
-            </a:endParaRPr>
-          </a:p>
-        </p:txBody>
-      </p:sp>
-      <p:sp>
-        <p:nvSpPr>
-          <p:cNvPr id="12" name="Nach unten gekrümmter Pfeil 11"/>
+            <a:endParaRPr lang="de-DE"/>
+          </a:p>
+        </p:txBody>
+      </p:sp>
+      <p:sp>
+        <p:nvSpPr>
+          <p:cNvPr id="26" name="Pfeil nach rechts 25"/>
           <p:cNvSpPr/>
           <p:nvPr/>
         </p:nvSpPr>
         <p:spPr>
           <a:xfrm>
-            <a:off x="3330144" y="170934"/>
-            <a:ext cx="2423987" cy="1526059"/>
-          </a:xfrm>
-          <a:prstGeom prst="curvedDownArrow">
+            <a:off x="2775635" y="1952109"/>
+            <a:ext cx="1580199" cy="301711"/>
+          </a:xfrm>
+          <a:prstGeom prst="rightArrow">
             <a:avLst/>
           </a:prstGeom>
           <a:solidFill>
@@ -4810,26 +8376,22 @@
           <a:lstStyle/>
           <a:p>
             <a:pPr algn="ctr"/>
-            <a:endParaRPr lang="de-DE">
-              <a:solidFill>
-                <a:schemeClr val="tx1"/>
-              </a:solidFill>
-            </a:endParaRPr>
-          </a:p>
-        </p:txBody>
-      </p:sp>
-      <p:sp>
-        <p:nvSpPr>
-          <p:cNvPr id="4" name="Rechteck 3"/>
+            <a:endParaRPr lang="de-DE"/>
+          </a:p>
+        </p:txBody>
+      </p:sp>
+      <p:sp>
+        <p:nvSpPr>
+          <p:cNvPr id="25" name="Pfeil nach rechts 24"/>
           <p:cNvSpPr/>
           <p:nvPr/>
         </p:nvSpPr>
         <p:spPr>
           <a:xfrm>
-            <a:off x="988539" y="533399"/>
-            <a:ext cx="2520777" cy="976184"/>
-          </a:xfrm>
-          <a:prstGeom prst="rect">
+            <a:off x="2829245" y="2850292"/>
+            <a:ext cx="1580199" cy="301711"/>
+          </a:xfrm>
+          <a:prstGeom prst="rightArrow">
             <a:avLst/>
           </a:prstGeom>
           <a:solidFill>
@@ -4861,52 +8423,23 @@
           </a:fontRef>
         </p:style>
         <p:txBody>
-          <a:bodyPr rtlCol="0" anchor="t"/>
-          <a:lstStyle/>
-          <a:p>
-            <a:r>
-              <a:rPr lang="en-US" dirty="0" smtClean="0">
-                <a:solidFill>
-                  <a:schemeClr val="tx1"/>
-                </a:solidFill>
-              </a:rPr>
-              <a:t>Task #3</a:t>
-            </a:r>
-          </a:p>
-          <a:p>
-            <a:endParaRPr lang="en-US" noProof="1" smtClean="0">
-              <a:solidFill>
-                <a:schemeClr val="tx1"/>
-              </a:solidFill>
-            </a:endParaRPr>
-          </a:p>
+          <a:bodyPr rtlCol="0" anchor="ctr"/>
+          <a:lstStyle/>
           <a:p>
             <a:pPr algn="ctr"/>
-            <a:r>
-              <a:rPr lang="en-US" noProof="1" smtClean="0">
-                <a:solidFill>
-                  <a:schemeClr val="tx1"/>
-                </a:solidFill>
-              </a:rPr>
-              <a:t>(sc, qos, nr_simulations)</a:t>
-            </a:r>
-            <a:endParaRPr lang="en-US" noProof="1">
-              <a:solidFill>
-                <a:schemeClr val="tx1"/>
-              </a:solidFill>
-            </a:endParaRPr>
-          </a:p>
-        </p:txBody>
-      </p:sp>
-      <p:sp>
-        <p:nvSpPr>
-          <p:cNvPr id="6" name="Rechteck 5"/>
+            <a:endParaRPr lang="de-DE"/>
+          </a:p>
+        </p:txBody>
+      </p:sp>
+      <p:sp>
+        <p:nvSpPr>
+          <p:cNvPr id="4" name="Rechteck 3"/>
           <p:cNvSpPr/>
           <p:nvPr/>
         </p:nvSpPr>
         <p:spPr>
           <a:xfrm>
-            <a:off x="928815" y="720810"/>
+            <a:off x="552389" y="984935"/>
             <a:ext cx="2520777" cy="976184"/>
           </a:xfrm>
           <a:prstGeom prst="rect">
@@ -4950,7 +8483,7 @@
                   <a:schemeClr val="tx1"/>
                 </a:solidFill>
               </a:rPr>
-              <a:t>Task #2</a:t>
+              <a:t>Task #3</a:t>
             </a:r>
           </a:p>
           <a:p>
@@ -4980,13 +8513,13 @@
       </p:sp>
       <p:sp>
         <p:nvSpPr>
-          <p:cNvPr id="8" name="Rechteck 7"/>
+          <p:cNvPr id="6" name="Rechteck 5"/>
           <p:cNvSpPr/>
           <p:nvPr/>
         </p:nvSpPr>
         <p:spPr>
           <a:xfrm>
-            <a:off x="869091" y="908221"/>
+            <a:off x="492665" y="1172346"/>
             <a:ext cx="2520777" cy="976184"/>
           </a:xfrm>
           <a:prstGeom prst="rect">
@@ -5030,7 +8563,7 @@
                   <a:schemeClr val="tx1"/>
                 </a:solidFill>
               </a:rPr>
-              <a:t>Task #1</a:t>
+              <a:t>Task #2</a:t>
             </a:r>
           </a:p>
           <a:p>
@@ -5060,13 +8593,13 @@
       </p:sp>
       <p:sp>
         <p:nvSpPr>
-          <p:cNvPr id="9" name="Rechteck 8"/>
+          <p:cNvPr id="8" name="Rechteck 7"/>
           <p:cNvSpPr/>
           <p:nvPr/>
         </p:nvSpPr>
         <p:spPr>
           <a:xfrm>
-            <a:off x="928815" y="2514599"/>
+            <a:off x="432941" y="1359757"/>
             <a:ext cx="2520777" cy="976184"/>
           </a:xfrm>
           <a:prstGeom prst="rect">
@@ -5110,7 +8643,7 @@
                   <a:schemeClr val="tx1"/>
                 </a:solidFill>
               </a:rPr>
-              <a:t>Task #3</a:t>
+              <a:t>Task #1</a:t>
             </a:r>
           </a:p>
           <a:p>
@@ -5140,13 +8673,13 @@
       </p:sp>
       <p:sp>
         <p:nvSpPr>
-          <p:cNvPr id="10" name="Rechteck 9"/>
+          <p:cNvPr id="9" name="Rechteck 8"/>
           <p:cNvSpPr/>
           <p:nvPr/>
         </p:nvSpPr>
         <p:spPr>
           <a:xfrm>
-            <a:off x="869091" y="2702010"/>
+            <a:off x="492665" y="2691197"/>
             <a:ext cx="2520777" cy="976184"/>
           </a:xfrm>
           <a:prstGeom prst="rect">
@@ -5190,7 +8723,7 @@
                   <a:schemeClr val="tx1"/>
                 </a:solidFill>
               </a:rPr>
-              <a:t>Task #2</a:t>
+              <a:t>Task #3</a:t>
             </a:r>
           </a:p>
           <a:p>
@@ -5220,13 +8753,93 @@
       </p:sp>
       <p:sp>
         <p:nvSpPr>
+          <p:cNvPr id="10" name="Rechteck 9"/>
+          <p:cNvSpPr/>
+          <p:nvPr/>
+        </p:nvSpPr>
+        <p:spPr>
+          <a:xfrm>
+            <a:off x="432941" y="2878608"/>
+            <a:ext cx="2520777" cy="976184"/>
+          </a:xfrm>
+          <a:prstGeom prst="rect">
+            <a:avLst/>
+          </a:prstGeom>
+          <a:solidFill>
+            <a:schemeClr val="accent1">
+              <a:lumMod val="40000"/>
+              <a:lumOff val="60000"/>
+            </a:schemeClr>
+          </a:solidFill>
+          <a:ln>
+            <a:solidFill>
+              <a:schemeClr val="tx1"/>
+            </a:solidFill>
+          </a:ln>
+        </p:spPr>
+        <p:style>
+          <a:lnRef idx="2">
+            <a:schemeClr val="accent1">
+              <a:shade val="50000"/>
+            </a:schemeClr>
+          </a:lnRef>
+          <a:fillRef idx="1">
+            <a:schemeClr val="accent1"/>
+          </a:fillRef>
+          <a:effectRef idx="0">
+            <a:schemeClr val="accent1"/>
+          </a:effectRef>
+          <a:fontRef idx="minor">
+            <a:schemeClr val="lt1"/>
+          </a:fontRef>
+        </p:style>
+        <p:txBody>
+          <a:bodyPr rtlCol="0" anchor="t"/>
+          <a:lstStyle/>
+          <a:p>
+            <a:r>
+              <a:rPr lang="en-US" dirty="0" smtClean="0">
+                <a:solidFill>
+                  <a:schemeClr val="tx1"/>
+                </a:solidFill>
+              </a:rPr>
+              <a:t>Task #2</a:t>
+            </a:r>
+          </a:p>
+          <a:p>
+            <a:endParaRPr lang="en-US" noProof="1" smtClean="0">
+              <a:solidFill>
+                <a:schemeClr val="tx1"/>
+              </a:solidFill>
+            </a:endParaRPr>
+          </a:p>
+          <a:p>
+            <a:pPr algn="ctr"/>
+            <a:r>
+              <a:rPr lang="en-US" noProof="1" smtClean="0">
+                <a:solidFill>
+                  <a:schemeClr val="tx1"/>
+                </a:solidFill>
+              </a:rPr>
+              <a:t>(sc, qos, nr_simulations)</a:t>
+            </a:r>
+            <a:endParaRPr lang="en-US" noProof="1">
+              <a:solidFill>
+                <a:schemeClr val="tx1"/>
+              </a:solidFill>
+            </a:endParaRPr>
+          </a:p>
+        </p:txBody>
+      </p:sp>
+      <p:sp>
+        <p:nvSpPr>
           <p:cNvPr id="11" name="Rechteck 10"/>
           <p:cNvSpPr/>
           <p:nvPr/>
         </p:nvSpPr>
         <p:spPr>
           <a:xfrm>
-            <a:off x="809367" y="2889421"/>
+            <a:off x="373217" y="3066019"/>
             <a:ext cx="2520777" cy="976184"/>
           </a:xfrm>
           <a:prstGeom prst="rect">
@@ -5811,57 +9424,6 @@
           </a:ln>
         </p:spPr>
       </p:pic>
-      <p:sp>
-        <p:nvSpPr>
-          <p:cNvPr id="31" name="Pfeil nach rechts 30"/>
-          <p:cNvSpPr/>
-          <p:nvPr/>
-        </p:nvSpPr>
-        <p:spPr>
-          <a:xfrm rot="5400000">
-            <a:off x="5956217" y="2639335"/>
-            <a:ext cx="512292" cy="2332576"/>
-          </a:xfrm>
-          <a:prstGeom prst="rightArrow">
-            <a:avLst/>
-          </a:prstGeom>
-          <a:solidFill>
-            <a:schemeClr val="accent1">
-              <a:lumMod val="40000"/>
-              <a:lumOff val="60000"/>
-            </a:schemeClr>
-          </a:solidFill>
-          <a:ln>
-            <a:solidFill>
-              <a:schemeClr val="tx1"/>
-            </a:solidFill>
-          </a:ln>
-        </p:spPr>
-        <p:style>
-          <a:lnRef idx="2">
-            <a:schemeClr val="accent1">
-              <a:shade val="50000"/>
-            </a:schemeClr>
-          </a:lnRef>
-          <a:fillRef idx="1">
-            <a:schemeClr val="accent1"/>
-          </a:fillRef>
-          <a:effectRef idx="0">
-            <a:schemeClr val="accent1"/>
-          </a:effectRef>
-          <a:fontRef idx="minor">
-            <a:schemeClr val="lt1"/>
-          </a:fontRef>
-        </p:style>
-        <p:txBody>
-          <a:bodyPr rtlCol="0" anchor="ctr"/>
-          <a:lstStyle/>
-          <a:p>
-            <a:pPr algn="ctr"/>
-            <a:endParaRPr lang="de-DE"/>
-          </a:p>
-        </p:txBody>
-      </p:sp>
       <p:sp>
         <p:nvSpPr>
           <p:cNvPr id="40" name="Rechteck 39"/>

</xml_diff>